<commit_message>
More pythonic function names in learning_python 20 presentation
</commit_message>
<xml_diff>
--- a/python/presentations/learning_python/20_ceda-error.pptx
+++ b/python/presentations/learning_python/20_ceda-error.pptx
@@ -266,7 +266,7 @@
               <a:pPr>
                 <a:defRPr/>
               </a:pPr>
-              <a:t>09/10/2018</a:t>
+              <a:t>18/12/2018</a:t>
             </a:fld>
             <a:endParaRPr lang="en-GB"/>
           </a:p>
@@ -3809,7 +3809,7 @@
               <a:pPr>
                 <a:defRPr/>
               </a:pPr>
-              <a:t>09/10/2018</a:t>
+              <a:t>18/12/2018</a:t>
             </a:fld>
             <a:endParaRPr lang="en-GB"/>
           </a:p>
@@ -4046,7 +4046,7 @@
               <a:pPr>
                 <a:defRPr/>
               </a:pPr>
-              <a:t>09/10/2018</a:t>
+              <a:t>18/12/2018</a:t>
             </a:fld>
             <a:endParaRPr lang="en-GB"/>
           </a:p>
@@ -4767,7 +4767,7 @@
               <a:pPr>
                 <a:defRPr/>
               </a:pPr>
-              <a:t>09/10/2018</a:t>
+              <a:t>18/12/2018</a:t>
             </a:fld>
             <a:endParaRPr lang="en-GB"/>
           </a:p>
@@ -6007,28 +6007,28 @@
               <a:buNone/>
             </a:pPr>
             <a:r>
-              <a:rPr lang="en-GB" altLang="en-US" sz="2000" b="1" smtClean="0">
+              <a:rPr lang="en-GB" altLang="en-US" sz="2000" b="1" dirty="0" smtClean="0">
                 <a:latin typeface="Courier New" panose="02070309020205020404" pitchFamily="49" charset="0"/>
                 <a:cs typeface="Courier New" panose="02070309020205020404" pitchFamily="49" charset="0"/>
               </a:rPr>
               <a:t>for</a:t>
             </a:r>
             <a:r>
-              <a:rPr lang="en-GB" altLang="en-US" sz="2000" smtClean="0">
+              <a:rPr lang="en-GB" altLang="en-US" sz="2000" dirty="0" smtClean="0">
                 <a:latin typeface="Courier New" panose="02070309020205020404" pitchFamily="49" charset="0"/>
                 <a:cs typeface="Courier New" panose="02070309020205020404" pitchFamily="49" charset="0"/>
               </a:rPr>
               <a:t> f </a:t>
             </a:r>
             <a:r>
-              <a:rPr lang="en-GB" altLang="en-US" sz="2000" b="1" smtClean="0">
+              <a:rPr lang="en-GB" altLang="en-US" sz="2000" b="1" dirty="0" smtClean="0">
                 <a:latin typeface="Courier New" panose="02070309020205020404" pitchFamily="49" charset="0"/>
                 <a:cs typeface="Courier New" panose="02070309020205020404" pitchFamily="49" charset="0"/>
               </a:rPr>
               <a:t>in</a:t>
             </a:r>
             <a:r>
-              <a:rPr lang="en-GB" altLang="en-US" sz="2000" smtClean="0">
+              <a:rPr lang="en-GB" altLang="en-US" sz="2000" dirty="0" smtClean="0">
                 <a:latin typeface="Courier New" panose="02070309020205020404" pitchFamily="49" charset="0"/>
                 <a:cs typeface="Courier New" panose="02070309020205020404" pitchFamily="49" charset="0"/>
               </a:rPr>
@@ -6041,11 +6041,58 @@
               <a:buNone/>
             </a:pPr>
             <a:r>
-              <a:rPr lang="en-GB" altLang="en-US" sz="2000" b="1" smtClean="0">
+              <a:rPr lang="en-GB" altLang="en-US" sz="2000" b="1" dirty="0" smtClean="0">
                 <a:latin typeface="Courier New" panose="02070309020205020404" pitchFamily="49" charset="0"/>
                 <a:cs typeface="Courier New" panose="02070309020205020404" pitchFamily="49" charset="0"/>
               </a:rPr>
               <a:t>    try:</a:t>
+            </a:r>
+          </a:p>
+          <a:p>
+            <a:pPr marL="0" indent="0">
+              <a:buNone/>
+            </a:pPr>
+            <a:r>
+              <a:rPr lang="en-GB" altLang="en-US" sz="2000" dirty="0" smtClean="0">
+                <a:latin typeface="Courier New" panose="02070309020205020404" pitchFamily="49" charset="0"/>
+                <a:cs typeface="Courier New" panose="02070309020205020404" pitchFamily="49" charset="0"/>
+              </a:rPr>
+              <a:t>        </a:t>
+            </a:r>
+            <a:r>
+              <a:rPr lang="en-GB" altLang="en-US" sz="2000" b="1" dirty="0" smtClean="0">
+                <a:latin typeface="Courier New" panose="02070309020205020404" pitchFamily="49" charset="0"/>
+                <a:cs typeface="Courier New" panose="02070309020205020404" pitchFamily="49" charset="0"/>
+              </a:rPr>
+              <a:t>print</a:t>
+            </a:r>
+            <a:r>
+              <a:rPr lang="en-GB" altLang="en-US" sz="2000" dirty="0">
+                <a:latin typeface="Courier New" panose="02070309020205020404" pitchFamily="49" charset="0"/>
+                <a:cs typeface="Courier New" panose="02070309020205020404" pitchFamily="49" charset="0"/>
+              </a:rPr>
+              <a:t>(</a:t>
+            </a:r>
+            <a:r>
+              <a:rPr lang="en-GB" altLang="en-US" sz="2000" dirty="0" err="1">
+                <a:latin typeface="Courier New" panose="02070309020205020404" pitchFamily="49" charset="0"/>
+                <a:cs typeface="Courier New" panose="02070309020205020404" pitchFamily="49" charset="0"/>
+              </a:rPr>
+              <a:t>read_int_from_file</a:t>
+            </a:r>
+            <a:r>
+              <a:rPr lang="en-GB" altLang="en-US" sz="2000" dirty="0">
+                <a:latin typeface="Courier New" panose="02070309020205020404" pitchFamily="49" charset="0"/>
+                <a:cs typeface="Courier New" panose="02070309020205020404" pitchFamily="49" charset="0"/>
+              </a:rPr>
+              <a:t>(f</a:t>
+            </a:r>
+            <a:r>
+              <a:rPr lang="en-GB" altLang="en-US" sz="2000" dirty="0" smtClean="0">
+                <a:latin typeface="Courier New" panose="02070309020205020404" pitchFamily="49" charset="0"/>
+                <a:cs typeface="Courier New" panose="02070309020205020404" pitchFamily="49" charset="0"/>
+              </a:rPr>
+              <a:t>))</a:t>
             </a:r>
           </a:p>
           <a:p>
@@ -6054,25 +6101,25 @@
               <a:buNone/>
             </a:pPr>
             <a:r>
-              <a:rPr lang="en-GB" altLang="en-US" sz="2000" smtClean="0">
+              <a:rPr lang="en-GB" altLang="en-US" sz="2000" b="1" dirty="0" smtClean="0">
                 <a:latin typeface="Courier New" panose="02070309020205020404" pitchFamily="49" charset="0"/>
                 <a:cs typeface="Courier New" panose="02070309020205020404" pitchFamily="49" charset="0"/>
               </a:rPr>
-              <a:t>        </a:t>
-            </a:r>
-            <a:r>
-              <a:rPr lang="en-GB" altLang="en-US" sz="2000" b="1" smtClean="0">
+              <a:t>    except </a:t>
+            </a:r>
+            <a:r>
+              <a:rPr lang="en-GB" altLang="en-US" sz="2000" dirty="0" err="1" smtClean="0">
                 <a:latin typeface="Courier New" panose="02070309020205020404" pitchFamily="49" charset="0"/>
                 <a:cs typeface="Courier New" panose="02070309020205020404" pitchFamily="49" charset="0"/>
               </a:rPr>
-              <a:t>print</a:t>
-            </a:r>
-            <a:r>
-              <a:rPr lang="en-GB" altLang="en-US" sz="2000" smtClean="0">
+              <a:t>IOError</a:t>
+            </a:r>
+            <a:r>
+              <a:rPr lang="en-GB" altLang="en-US" sz="2000" b="1" dirty="0" smtClean="0">
                 <a:latin typeface="Courier New" panose="02070309020205020404" pitchFamily="49" charset="0"/>
                 <a:cs typeface="Courier New" panose="02070309020205020404" pitchFamily="49" charset="0"/>
               </a:rPr>
-              <a:t>(readIntFromFile(f))</a:t>
+              <a:t>:</a:t>
             </a:r>
           </a:p>
           <a:p>
@@ -6081,25 +6128,25 @@
               <a:buNone/>
             </a:pPr>
             <a:r>
-              <a:rPr lang="en-GB" altLang="en-US" sz="2000" b="1" smtClean="0">
+              <a:rPr lang="en-GB" altLang="en-US" sz="2000" dirty="0" smtClean="0">
                 <a:latin typeface="Courier New" panose="02070309020205020404" pitchFamily="49" charset="0"/>
                 <a:cs typeface="Courier New" panose="02070309020205020404" pitchFamily="49" charset="0"/>
               </a:rPr>
-              <a:t>    except </a:t>
-            </a:r>
-            <a:r>
-              <a:rPr lang="en-GB" altLang="en-US" sz="2000" smtClean="0">
+              <a:t>        </a:t>
+            </a:r>
+            <a:r>
+              <a:rPr lang="en-GB" altLang="en-US" sz="2000" b="1" dirty="0" smtClean="0">
                 <a:latin typeface="Courier New" panose="02070309020205020404" pitchFamily="49" charset="0"/>
                 <a:cs typeface="Courier New" panose="02070309020205020404" pitchFamily="49" charset="0"/>
               </a:rPr>
-              <a:t>IOError</a:t>
-            </a:r>
-            <a:r>
-              <a:rPr lang="en-GB" altLang="en-US" sz="2000" b="1" smtClean="0">
+              <a:t>print</a:t>
+            </a:r>
+            <a:r>
+              <a:rPr lang="en-GB" altLang="en-US" sz="2000" dirty="0" smtClean="0">
                 <a:latin typeface="Courier New" panose="02070309020205020404" pitchFamily="49" charset="0"/>
                 <a:cs typeface="Courier New" panose="02070309020205020404" pitchFamily="49" charset="0"/>
               </a:rPr>
-              <a:t>:</a:t>
+              <a:t>("There is nothing in file: {0}".format(f))</a:t>
             </a:r>
           </a:p>
           <a:p>
@@ -6108,25 +6155,25 @@
               <a:buNone/>
             </a:pPr>
             <a:r>
-              <a:rPr lang="en-GB" altLang="en-US" sz="2000" smtClean="0">
+              <a:rPr lang="en-GB" altLang="en-US" sz="2000" b="1" dirty="0" smtClean="0">
                 <a:latin typeface="Courier New" panose="02070309020205020404" pitchFamily="49" charset="0"/>
                 <a:cs typeface="Courier New" panose="02070309020205020404" pitchFamily="49" charset="0"/>
               </a:rPr>
-              <a:t>        </a:t>
-            </a:r>
-            <a:r>
-              <a:rPr lang="en-GB" altLang="en-US" sz="2000" b="1" smtClean="0">
+              <a:t>    except </a:t>
+            </a:r>
+            <a:r>
+              <a:rPr lang="en-GB" altLang="en-US" sz="2000" dirty="0" err="1" smtClean="0">
                 <a:latin typeface="Courier New" panose="02070309020205020404" pitchFamily="49" charset="0"/>
                 <a:cs typeface="Courier New" panose="02070309020205020404" pitchFamily="49" charset="0"/>
               </a:rPr>
-              <a:t>print</a:t>
-            </a:r>
-            <a:r>
-              <a:rPr lang="en-GB" altLang="en-US" sz="2000" smtClean="0">
+              <a:t>ValueError</a:t>
+            </a:r>
+            <a:r>
+              <a:rPr lang="en-GB" altLang="en-US" sz="2000" b="1" dirty="0" smtClean="0">
                 <a:latin typeface="Courier New" panose="02070309020205020404" pitchFamily="49" charset="0"/>
                 <a:cs typeface="Courier New" panose="02070309020205020404" pitchFamily="49" charset="0"/>
               </a:rPr>
-              <a:t>("There is nothing in file: {0}".format(f))</a:t>
+              <a:t>:</a:t>
             </a:r>
           </a:p>
           <a:p>
@@ -6135,25 +6182,39 @@
               <a:buNone/>
             </a:pPr>
             <a:r>
-              <a:rPr lang="en-GB" altLang="en-US" sz="2000" b="1" smtClean="0">
+              <a:rPr lang="en-GB" altLang="en-US" sz="2000" dirty="0" smtClean="0">
                 <a:latin typeface="Courier New" panose="02070309020205020404" pitchFamily="49" charset="0"/>
                 <a:cs typeface="Courier New" panose="02070309020205020404" pitchFamily="49" charset="0"/>
               </a:rPr>
-              <a:t>    except </a:t>
-            </a:r>
-            <a:r>
-              <a:rPr lang="en-GB" altLang="en-US" sz="2000" smtClean="0">
+              <a:t>        </a:t>
+            </a:r>
+            <a:r>
+              <a:rPr lang="en-GB" altLang="en-US" sz="2000" b="1" dirty="0" smtClean="0">
                 <a:latin typeface="Courier New" panose="02070309020205020404" pitchFamily="49" charset="0"/>
                 <a:cs typeface="Courier New" panose="02070309020205020404" pitchFamily="49" charset="0"/>
               </a:rPr>
-              <a:t>ValueError</a:t>
-            </a:r>
-            <a:r>
-              <a:rPr lang="en-GB" altLang="en-US" sz="2000" b="1" smtClean="0">
+              <a:t>print</a:t>
+            </a:r>
+            <a:r>
+              <a:rPr lang="en-GB" altLang="en-US" sz="2000" dirty="0" smtClean="0">
                 <a:latin typeface="Courier New" panose="02070309020205020404" pitchFamily="49" charset="0"/>
                 <a:cs typeface="Courier New" panose="02070309020205020404" pitchFamily="49" charset="0"/>
               </a:rPr>
-              <a:t>:</a:t>
+              <a:t>("Could not convert to </a:t>
+            </a:r>
+            <a:r>
+              <a:rPr lang="en-GB" altLang="en-US" sz="2000" dirty="0" err="1" smtClean="0">
+                <a:latin typeface="Courier New" panose="02070309020205020404" pitchFamily="49" charset="0"/>
+                <a:cs typeface="Courier New" panose="02070309020205020404" pitchFamily="49" charset="0"/>
+              </a:rPr>
+              <a:t>int</a:t>
+            </a:r>
+            <a:r>
+              <a:rPr lang="en-GB" altLang="en-US" sz="2000" dirty="0" smtClean="0">
+                <a:latin typeface="Courier New" panose="02070309020205020404" pitchFamily="49" charset="0"/>
+                <a:cs typeface="Courier New" panose="02070309020205020404" pitchFamily="49" charset="0"/>
+              </a:rPr>
+              <a:t>: {0} ".format(f))</a:t>
             </a:r>
           </a:p>
           <a:p>
@@ -6162,25 +6223,39 @@
               <a:buNone/>
             </a:pPr>
             <a:r>
-              <a:rPr lang="en-GB" altLang="en-US" sz="2000" smtClean="0">
+              <a:rPr lang="en-GB" altLang="en-US" sz="2000" b="1" dirty="0" smtClean="0">
                 <a:latin typeface="Courier New" panose="02070309020205020404" pitchFamily="49" charset="0"/>
                 <a:cs typeface="Courier New" panose="02070309020205020404" pitchFamily="49" charset="0"/>
               </a:rPr>
-              <a:t>        </a:t>
-            </a:r>
-            <a:r>
-              <a:rPr lang="en-GB" altLang="en-US" sz="2000" b="1" smtClean="0">
+              <a:t>    except </a:t>
+            </a:r>
+            <a:r>
+              <a:rPr lang="en-GB" altLang="en-US" sz="2000" dirty="0" smtClean="0">
                 <a:latin typeface="Courier New" panose="02070309020205020404" pitchFamily="49" charset="0"/>
                 <a:cs typeface="Courier New" panose="02070309020205020404" pitchFamily="49" charset="0"/>
               </a:rPr>
-              <a:t>print</a:t>
-            </a:r>
-            <a:r>
-              <a:rPr lang="en-GB" altLang="en-US" sz="2000" smtClean="0">
+              <a:t>Exception </a:t>
+            </a:r>
+            <a:r>
+              <a:rPr lang="en-GB" altLang="en-US" sz="2000" b="1" dirty="0" smtClean="0">
                 <a:latin typeface="Courier New" panose="02070309020205020404" pitchFamily="49" charset="0"/>
                 <a:cs typeface="Courier New" panose="02070309020205020404" pitchFamily="49" charset="0"/>
               </a:rPr>
-              <a:t>("Could not convert to int: {0} ".format(f))</a:t>
+              <a:t>as</a:t>
+            </a:r>
+            <a:r>
+              <a:rPr lang="en-GB" altLang="en-US" sz="2000" dirty="0" smtClean="0">
+                <a:latin typeface="Courier New" panose="02070309020205020404" pitchFamily="49" charset="0"/>
+                <a:cs typeface="Courier New" panose="02070309020205020404" pitchFamily="49" charset="0"/>
+              </a:rPr>
+              <a:t> err</a:t>
+            </a:r>
+            <a:r>
+              <a:rPr lang="en-GB" altLang="en-US" sz="2000" b="1" dirty="0" smtClean="0">
+                <a:latin typeface="Courier New" panose="02070309020205020404" pitchFamily="49" charset="0"/>
+                <a:cs typeface="Courier New" panose="02070309020205020404" pitchFamily="49" charset="0"/>
+              </a:rPr>
+              <a:t>:</a:t>
             </a:r>
           </a:p>
           <a:p>
@@ -6189,39 +6264,25 @@
               <a:buNone/>
             </a:pPr>
             <a:r>
-              <a:rPr lang="en-GB" altLang="en-US" sz="2000" b="1" smtClean="0">
+              <a:rPr lang="en-GB" altLang="en-US" sz="2000" dirty="0" smtClean="0">
                 <a:latin typeface="Courier New" panose="02070309020205020404" pitchFamily="49" charset="0"/>
                 <a:cs typeface="Courier New" panose="02070309020205020404" pitchFamily="49" charset="0"/>
               </a:rPr>
-              <a:t>    except </a:t>
-            </a:r>
-            <a:r>
-              <a:rPr lang="en-GB" altLang="en-US" sz="2000" smtClean="0">
+              <a:t>        </a:t>
+            </a:r>
+            <a:r>
+              <a:rPr lang="en-GB" altLang="en-US" sz="2000" b="1" dirty="0" smtClean="0">
                 <a:latin typeface="Courier New" panose="02070309020205020404" pitchFamily="49" charset="0"/>
                 <a:cs typeface="Courier New" panose="02070309020205020404" pitchFamily="49" charset="0"/>
               </a:rPr>
-              <a:t>Exception </a:t>
-            </a:r>
-            <a:r>
-              <a:rPr lang="en-GB" altLang="en-US" sz="2000" b="1" smtClean="0">
+              <a:t>print</a:t>
+            </a:r>
+            <a:r>
+              <a:rPr lang="en-GB" altLang="en-US" sz="2000" dirty="0" smtClean="0">
                 <a:latin typeface="Courier New" panose="02070309020205020404" pitchFamily="49" charset="0"/>
                 <a:cs typeface="Courier New" panose="02070309020205020404" pitchFamily="49" charset="0"/>
               </a:rPr>
-              <a:t>as</a:t>
-            </a:r>
-            <a:r>
-              <a:rPr lang="en-GB" altLang="en-US" sz="2000" smtClean="0">
-                <a:latin typeface="Courier New" panose="02070309020205020404" pitchFamily="49" charset="0"/>
-                <a:cs typeface="Courier New" panose="02070309020205020404" pitchFamily="49" charset="0"/>
-              </a:rPr>
-              <a:t> err</a:t>
-            </a:r>
-            <a:r>
-              <a:rPr lang="en-GB" altLang="en-US" sz="2000" b="1" smtClean="0">
-                <a:latin typeface="Courier New" panose="02070309020205020404" pitchFamily="49" charset="0"/>
-                <a:cs typeface="Courier New" panose="02070309020205020404" pitchFamily="49" charset="0"/>
-              </a:rPr>
-              <a:t>:</a:t>
+              <a:t>("Really unexpected error: {0}".format(err))</a:t>
             </a:r>
           </a:p>
           <a:p>
@@ -6229,45 +6290,18 @@
               <a:buFont typeface="Arial" panose="020B0604020202020204" pitchFamily="34" charset="0"/>
               <a:buNone/>
             </a:pPr>
-            <a:r>
-              <a:rPr lang="en-GB" altLang="en-US" sz="2000" smtClean="0">
-                <a:latin typeface="Courier New" panose="02070309020205020404" pitchFamily="49" charset="0"/>
-                <a:cs typeface="Courier New" panose="02070309020205020404" pitchFamily="49" charset="0"/>
-              </a:rPr>
-              <a:t>        </a:t>
-            </a:r>
-            <a:r>
-              <a:rPr lang="en-GB" altLang="en-US" sz="2000" b="1" smtClean="0">
-                <a:latin typeface="Courier New" panose="02070309020205020404" pitchFamily="49" charset="0"/>
-                <a:cs typeface="Courier New" panose="02070309020205020404" pitchFamily="49" charset="0"/>
-              </a:rPr>
-              <a:t>print</a:t>
-            </a:r>
-            <a:r>
-              <a:rPr lang="en-GB" altLang="en-US" sz="2000" smtClean="0">
-                <a:latin typeface="Courier New" panose="02070309020205020404" pitchFamily="49" charset="0"/>
-                <a:cs typeface="Courier New" panose="02070309020205020404" pitchFamily="49" charset="0"/>
-              </a:rPr>
-              <a:t>("Really unexpected error: {0}".format(err))</a:t>
-            </a:r>
+            <a:endParaRPr lang="en-GB" altLang="en-US" sz="2000" dirty="0" smtClean="0">
+              <a:latin typeface="Courier New" panose="02070309020205020404" pitchFamily="49" charset="0"/>
+              <a:cs typeface="Courier New" panose="02070309020205020404" pitchFamily="49" charset="0"/>
+            </a:endParaRPr>
           </a:p>
           <a:p>
             <a:pPr marL="0" indent="0">
               <a:buFont typeface="Arial" panose="020B0604020202020204" pitchFamily="34" charset="0"/>
               <a:buNone/>
             </a:pPr>
-            <a:endParaRPr lang="en-GB" altLang="en-US" sz="2000" smtClean="0">
-              <a:latin typeface="Courier New" panose="02070309020205020404" pitchFamily="49" charset="0"/>
-              <a:cs typeface="Courier New" panose="02070309020205020404" pitchFamily="49" charset="0"/>
-            </a:endParaRPr>
-          </a:p>
-          <a:p>
-            <a:pPr marL="0" indent="0">
-              <a:buFont typeface="Arial" panose="020B0604020202020204" pitchFamily="34" charset="0"/>
-              <a:buNone/>
-            </a:pPr>
-            <a:r>
-              <a:rPr lang="en-GB" altLang="en-US" sz="2000" smtClean="0">
+            <a:r>
+              <a:rPr lang="en-GB" altLang="en-US" sz="2000" dirty="0" smtClean="0">
                 <a:solidFill>
                   <a:srgbClr val="FFC000"/>
                 </a:solidFill>
@@ -7952,14 +7986,21 @@
                 <a:latin typeface="Courier New" panose="02070309020205020404" pitchFamily="49" charset="0"/>
                 <a:cs typeface="Courier New" panose="02070309020205020404" pitchFamily="49" charset="0"/>
               </a:rPr>
-              <a:t>runMyClimateModel</a:t>
+              <a:t>run_my_climate_model</a:t>
             </a:r>
             <a:r>
               <a:rPr lang="en-GB" sz="2000" dirty="0" smtClean="0">
                 <a:latin typeface="Courier New" panose="02070309020205020404" pitchFamily="49" charset="0"/>
                 <a:cs typeface="Courier New" panose="02070309020205020404" pitchFamily="49" charset="0"/>
               </a:rPr>
-              <a:t>(experiment)</a:t>
+              <a:t>(experiment</a:t>
+            </a:r>
+            <a:r>
+              <a:rPr lang="en-GB" sz="2000" dirty="0" smtClean="0">
+                <a:latin typeface="Courier New" panose="02070309020205020404" pitchFamily="49" charset="0"/>
+                <a:cs typeface="Courier New" panose="02070309020205020404" pitchFamily="49" charset="0"/>
+              </a:rPr>
+              <a:t>)</a:t>
             </a:r>
           </a:p>
           <a:p>
@@ -8034,7 +8075,7 @@
                 <a:latin typeface="Courier New" panose="02070309020205020404" pitchFamily="49" charset="0"/>
                 <a:cs typeface="Courier New" panose="02070309020205020404" pitchFamily="49" charset="0"/>
               </a:rPr>
-              <a:t>emailMe</a:t>
+              <a:t>email_me</a:t>
             </a:r>
             <a:r>
               <a:rPr lang="en-GB" sz="2000" dirty="0" smtClean="0">
@@ -9394,18 +9435,46 @@
               <a:buNone/>
             </a:pPr>
             <a:r>
-              <a:rPr lang="en-GB" altLang="en-US" sz="2400" b="1" smtClean="0">
+              <a:rPr lang="en-GB" altLang="en-US" sz="2400" b="1" dirty="0" smtClean="0">
                 <a:latin typeface="Courier New" panose="02070309020205020404" pitchFamily="49" charset="0"/>
                 <a:cs typeface="Courier New" panose="02070309020205020404" pitchFamily="49" charset="0"/>
               </a:rPr>
               <a:t>def</a:t>
             </a:r>
             <a:r>
-              <a:rPr lang="en-GB" altLang="en-US" sz="2400" smtClean="0">
+              <a:rPr lang="en-GB" altLang="en-US" sz="2400" dirty="0" smtClean="0">
                 <a:latin typeface="Courier New" panose="02070309020205020404" pitchFamily="49" charset="0"/>
                 <a:cs typeface="Courier New" panose="02070309020205020404" pitchFamily="49" charset="0"/>
               </a:rPr>
-              <a:t> readIntFromFile(fname):</a:t>
+              <a:t> </a:t>
+            </a:r>
+            <a:r>
+              <a:rPr lang="en-GB" altLang="en-US" sz="2400" dirty="0" err="1" smtClean="0">
+                <a:latin typeface="Courier New" panose="02070309020205020404" pitchFamily="49" charset="0"/>
+                <a:cs typeface="Courier New" panose="02070309020205020404" pitchFamily="49" charset="0"/>
+              </a:rPr>
+              <a:t>read_int_from_file</a:t>
+            </a:r>
+            <a:r>
+              <a:rPr lang="en-GB" altLang="en-US" sz="2400" dirty="0" smtClean="0">
+                <a:latin typeface="Courier New" panose="02070309020205020404" pitchFamily="49" charset="0"/>
+                <a:cs typeface="Courier New" panose="02070309020205020404" pitchFamily="49" charset="0"/>
+              </a:rPr>
+              <a:t>(</a:t>
+            </a:r>
+            <a:r>
+              <a:rPr lang="en-GB" altLang="en-US" sz="2400" dirty="0" err="1" smtClean="0">
+                <a:latin typeface="Courier New" panose="02070309020205020404" pitchFamily="49" charset="0"/>
+                <a:cs typeface="Courier New" panose="02070309020205020404" pitchFamily="49" charset="0"/>
+              </a:rPr>
+              <a:t>fname</a:t>
+            </a:r>
+            <a:r>
+              <a:rPr lang="en-GB" altLang="en-US" sz="2400" dirty="0" smtClean="0">
+                <a:latin typeface="Courier New" panose="02070309020205020404" pitchFamily="49" charset="0"/>
+                <a:cs typeface="Courier New" panose="02070309020205020404" pitchFamily="49" charset="0"/>
+              </a:rPr>
+              <a:t>):</a:t>
             </a:r>
           </a:p>
           <a:p>
@@ -9414,7 +9483,7 @@
               <a:buNone/>
             </a:pPr>
             <a:r>
-              <a:rPr lang="en-GB" altLang="en-US" sz="2400" smtClean="0">
+              <a:rPr lang="en-GB" altLang="en-US" sz="2400" dirty="0" smtClean="0">
                 <a:latin typeface="Courier New" panose="02070309020205020404" pitchFamily="49" charset="0"/>
                 <a:cs typeface="Courier New" panose="02070309020205020404" pitchFamily="49" charset="0"/>
               </a:rPr>
@@ -9427,35 +9496,49 @@
               <a:buNone/>
             </a:pPr>
             <a:r>
-              <a:rPr lang="en-GB" altLang="en-US" sz="2400" smtClean="0">
+              <a:rPr lang="en-GB" altLang="en-US" sz="2400" dirty="0" smtClean="0">
                 <a:latin typeface="Courier New" panose="02070309020205020404" pitchFamily="49" charset="0"/>
                 <a:cs typeface="Courier New" panose="02070309020205020404" pitchFamily="49" charset="0"/>
               </a:rPr>
               <a:t>    </a:t>
             </a:r>
             <a:r>
-              <a:rPr lang="en-GB" altLang="en-US" sz="2400" b="1" smtClean="0">
+              <a:rPr lang="en-GB" altLang="en-US" sz="2400" b="1" dirty="0" smtClean="0">
                 <a:latin typeface="Courier New" panose="02070309020205020404" pitchFamily="49" charset="0"/>
                 <a:cs typeface="Courier New" panose="02070309020205020404" pitchFamily="49" charset="0"/>
               </a:rPr>
               <a:t>with</a:t>
             </a:r>
             <a:r>
-              <a:rPr lang="en-GB" altLang="en-US" sz="2400" smtClean="0">
+              <a:rPr lang="en-GB" altLang="en-US" sz="2400" dirty="0" smtClean="0">
                 <a:latin typeface="Courier New" panose="02070309020205020404" pitchFamily="49" charset="0"/>
                 <a:cs typeface="Courier New" panose="02070309020205020404" pitchFamily="49" charset="0"/>
               </a:rPr>
-              <a:t> open(fname) </a:t>
-            </a:r>
-            <a:r>
-              <a:rPr lang="en-GB" altLang="en-US" sz="2400" b="1" smtClean="0">
+              <a:t> open(</a:t>
+            </a:r>
+            <a:r>
+              <a:rPr lang="en-GB" altLang="en-US" sz="2400" dirty="0" err="1" smtClean="0">
                 <a:latin typeface="Courier New" panose="02070309020205020404" pitchFamily="49" charset="0"/>
                 <a:cs typeface="Courier New" panose="02070309020205020404" pitchFamily="49" charset="0"/>
               </a:rPr>
+              <a:t>fname</a:t>
+            </a:r>
+            <a:r>
+              <a:rPr lang="en-GB" altLang="en-US" sz="2400" dirty="0" smtClean="0">
+                <a:latin typeface="Courier New" panose="02070309020205020404" pitchFamily="49" charset="0"/>
+                <a:cs typeface="Courier New" panose="02070309020205020404" pitchFamily="49" charset="0"/>
+              </a:rPr>
+              <a:t>) </a:t>
+            </a:r>
+            <a:r>
+              <a:rPr lang="en-GB" altLang="en-US" sz="2400" b="1" dirty="0" smtClean="0">
+                <a:latin typeface="Courier New" panose="02070309020205020404" pitchFamily="49" charset="0"/>
+                <a:cs typeface="Courier New" panose="02070309020205020404" pitchFamily="49" charset="0"/>
+              </a:rPr>
               <a:t>as</a:t>
             </a:r>
             <a:r>
-              <a:rPr lang="en-GB" altLang="en-US" sz="2400" smtClean="0">
+              <a:rPr lang="en-GB" altLang="en-US" sz="2400" dirty="0" smtClean="0">
                 <a:latin typeface="Courier New" panose="02070309020205020404" pitchFamily="49" charset="0"/>
                 <a:cs typeface="Courier New" panose="02070309020205020404" pitchFamily="49" charset="0"/>
               </a:rPr>
@@ -9468,11 +9551,53 @@
               <a:buNone/>
             </a:pPr>
             <a:r>
-              <a:rPr lang="en-GB" altLang="en-US" sz="2400" smtClean="0">
+              <a:rPr lang="en-GB" altLang="en-US" sz="2400" dirty="0" smtClean="0">
                 <a:latin typeface="Courier New" panose="02070309020205020404" pitchFamily="49" charset="0"/>
                 <a:cs typeface="Courier New" panose="02070309020205020404" pitchFamily="49" charset="0"/>
               </a:rPr>
-              <a:t>	    my_int = int(f.read(10))</a:t>
+              <a:t>	    </a:t>
+            </a:r>
+            <a:r>
+              <a:rPr lang="en-GB" altLang="en-US" sz="2400" dirty="0" err="1" smtClean="0">
+                <a:latin typeface="Courier New" panose="02070309020205020404" pitchFamily="49" charset="0"/>
+                <a:cs typeface="Courier New" panose="02070309020205020404" pitchFamily="49" charset="0"/>
+              </a:rPr>
+              <a:t>my_int</a:t>
+            </a:r>
+            <a:r>
+              <a:rPr lang="en-GB" altLang="en-US" sz="2400" dirty="0" smtClean="0">
+                <a:latin typeface="Courier New" panose="02070309020205020404" pitchFamily="49" charset="0"/>
+                <a:cs typeface="Courier New" panose="02070309020205020404" pitchFamily="49" charset="0"/>
+              </a:rPr>
+              <a:t> = </a:t>
+            </a:r>
+            <a:r>
+              <a:rPr lang="en-GB" altLang="en-US" sz="2400" dirty="0" err="1" smtClean="0">
+                <a:latin typeface="Courier New" panose="02070309020205020404" pitchFamily="49" charset="0"/>
+                <a:cs typeface="Courier New" panose="02070309020205020404" pitchFamily="49" charset="0"/>
+              </a:rPr>
+              <a:t>int</a:t>
+            </a:r>
+            <a:r>
+              <a:rPr lang="en-GB" altLang="en-US" sz="2400" dirty="0" smtClean="0">
+                <a:latin typeface="Courier New" panose="02070309020205020404" pitchFamily="49" charset="0"/>
+                <a:cs typeface="Courier New" panose="02070309020205020404" pitchFamily="49" charset="0"/>
+              </a:rPr>
+              <a:t>(</a:t>
+            </a:r>
+            <a:r>
+              <a:rPr lang="en-GB" altLang="en-US" sz="2400" dirty="0" err="1" smtClean="0">
+                <a:latin typeface="Courier New" panose="02070309020205020404" pitchFamily="49" charset="0"/>
+                <a:cs typeface="Courier New" panose="02070309020205020404" pitchFamily="49" charset="0"/>
+              </a:rPr>
+              <a:t>f.read</a:t>
+            </a:r>
+            <a:r>
+              <a:rPr lang="en-GB" altLang="en-US" sz="2400" dirty="0" smtClean="0">
+                <a:latin typeface="Courier New" panose="02070309020205020404" pitchFamily="49" charset="0"/>
+                <a:cs typeface="Courier New" panose="02070309020205020404" pitchFamily="49" charset="0"/>
+              </a:rPr>
+              <a:t>(10))</a:t>
             </a:r>
           </a:p>
           <a:p>
@@ -9481,7 +9606,7 @@
               <a:buNone/>
             </a:pPr>
             <a:r>
-              <a:rPr lang="en-GB" altLang="en-US" sz="2400" smtClean="0">
+              <a:rPr lang="en-GB" altLang="en-US" sz="2400" dirty="0" smtClean="0">
                 <a:latin typeface="Courier New" panose="02070309020205020404" pitchFamily="49" charset="0"/>
                 <a:cs typeface="Courier New" panose="02070309020205020404" pitchFamily="49" charset="0"/>
               </a:rPr>
@@ -9494,26 +9619,37 @@
               <a:buNone/>
             </a:pPr>
             <a:r>
-              <a:rPr lang="en-GB" altLang="en-US" sz="2400" smtClean="0">
+              <a:rPr lang="en-GB" altLang="en-US" sz="2400" dirty="0" smtClean="0">
                 <a:latin typeface="Courier New" panose="02070309020205020404" pitchFamily="49" charset="0"/>
                 <a:cs typeface="Courier New" panose="02070309020205020404" pitchFamily="49" charset="0"/>
               </a:rPr>
               <a:t>    </a:t>
             </a:r>
             <a:r>
-              <a:rPr lang="en-GB" altLang="en-US" sz="2400" b="1" smtClean="0">
+              <a:rPr lang="en-GB" altLang="en-US" sz="2400" b="1" dirty="0" smtClean="0">
                 <a:latin typeface="Courier New" panose="02070309020205020404" pitchFamily="49" charset="0"/>
                 <a:cs typeface="Courier New" panose="02070309020205020404" pitchFamily="49" charset="0"/>
               </a:rPr>
               <a:t>return</a:t>
             </a:r>
             <a:r>
-              <a:rPr lang="en-GB" altLang="en-US" sz="2400" smtClean="0">
+              <a:rPr lang="en-GB" altLang="en-US" sz="2400" dirty="0" smtClean="0">
                 <a:latin typeface="Courier New" panose="02070309020205020404" pitchFamily="49" charset="0"/>
                 <a:cs typeface="Courier New" panose="02070309020205020404" pitchFamily="49" charset="0"/>
               </a:rPr>
-              <a:t> my_int</a:t>
-            </a:r>
+              <a:t> </a:t>
+            </a:r>
+            <a:r>
+              <a:rPr lang="en-GB" altLang="en-US" sz="2400" dirty="0" err="1" smtClean="0">
+                <a:latin typeface="Courier New" panose="02070309020205020404" pitchFamily="49" charset="0"/>
+                <a:cs typeface="Courier New" panose="02070309020205020404" pitchFamily="49" charset="0"/>
+              </a:rPr>
+              <a:t>my_int</a:t>
+            </a:r>
+            <a:endParaRPr lang="en-GB" altLang="en-US" sz="2400" dirty="0" smtClean="0">
+              <a:latin typeface="Courier New" panose="02070309020205020404" pitchFamily="49" charset="0"/>
+              <a:cs typeface="Courier New" panose="02070309020205020404" pitchFamily="49" charset="0"/>
+            </a:endParaRPr>
           </a:p>
         </p:txBody>
       </p:sp>

</xml_diff>

<commit_message>
changing to use f strings for formatting
</commit_message>
<xml_diff>
--- a/python/presentations/learning_python/20_ceda-error.pptx
+++ b/python/presentations/learning_python/20_ceda-error.pptx
@@ -266,7 +266,7 @@
               <a:pPr>
                 <a:defRPr/>
               </a:pPr>
-              <a:t>18/12/2018</a:t>
+              <a:t>18/10/2021</a:t>
             </a:fld>
             <a:endParaRPr lang="en-GB"/>
           </a:p>
@@ -302,7 +302,7 @@
           <a:lstStyle/>
           <a:p>
             <a:pPr lvl="0"/>
-            <a:endParaRPr lang="en-GB" noProof="0" smtClean="0"/>
+            <a:endParaRPr lang="en-GB" noProof="0"/>
           </a:p>
         </p:txBody>
       </p:sp>
@@ -331,38 +331,38 @@
           <a:p>
             <a:pPr lvl="0"/>
             <a:r>
-              <a:rPr lang="en-US" noProof="0" smtClean="0"/>
+              <a:rPr lang="en-US" noProof="0"/>
               <a:t>Click to edit Master text styles</a:t>
             </a:r>
           </a:p>
           <a:p>
             <a:pPr lvl="1"/>
             <a:r>
-              <a:rPr lang="en-US" noProof="0" smtClean="0"/>
+              <a:rPr lang="en-US" noProof="0"/>
               <a:t>Second level</a:t>
             </a:r>
           </a:p>
           <a:p>
             <a:pPr lvl="2"/>
             <a:r>
-              <a:rPr lang="en-US" noProof="0" smtClean="0"/>
+              <a:rPr lang="en-US" noProof="0"/>
               <a:t>Third level</a:t>
             </a:r>
           </a:p>
           <a:p>
             <a:pPr lvl="3"/>
             <a:r>
-              <a:rPr lang="en-US" noProof="0" smtClean="0"/>
+              <a:rPr lang="en-US" noProof="0"/>
               <a:t>Fourth level</a:t>
             </a:r>
           </a:p>
           <a:p>
             <a:pPr lvl="4"/>
             <a:r>
-              <a:rPr lang="en-US" noProof="0" smtClean="0"/>
+              <a:rPr lang="en-US" noProof="0"/>
               <a:t>Fifth level</a:t>
             </a:r>
-            <a:endParaRPr lang="en-GB" noProof="0" smtClean="0"/>
+            <a:endParaRPr lang="en-GB" noProof="0"/>
           </a:p>
         </p:txBody>
       </p:sp>
@@ -670,7 +670,7 @@
               </a:spcBef>
             </a:pPr>
             <a:r>
-              <a:rPr lang="en-GB" altLang="en-US" smtClean="0"/>
+              <a:rPr lang="en-GB" altLang="en-US"/>
               <a:t>Syntax errors, also known as parsing errors, are perhaps the most common kind of complaint you get while you are still learning Python:</a:t>
             </a:r>
           </a:p>
@@ -680,7 +680,7 @@
                 <a:spcPct val="0"/>
               </a:spcBef>
             </a:pPr>
-            <a:endParaRPr lang="en-GB" altLang="en-US" smtClean="0"/>
+            <a:endParaRPr lang="en-GB" altLang="en-US"/>
           </a:p>
           <a:p>
             <a:pPr eaLnBrk="1" hangingPunct="1">
@@ -689,7 +689,7 @@
               </a:spcBef>
             </a:pPr>
             <a:r>
-              <a:rPr lang="en-GB" altLang="en-US" smtClean="0"/>
+              <a:rPr lang="en-GB" altLang="en-US"/>
               <a:t>&gt;&gt;&gt;</a:t>
             </a:r>
           </a:p>
@@ -700,7 +700,7 @@
               </a:spcBef>
             </a:pPr>
             <a:r>
-              <a:rPr lang="en-GB" altLang="en-US" smtClean="0"/>
+              <a:rPr lang="en-GB" altLang="en-US"/>
               <a:t>&gt;&gt;&gt; while True print 'Hello world' </a:t>
             </a:r>
           </a:p>
@@ -711,7 +711,7 @@
               </a:spcBef>
             </a:pPr>
             <a:r>
-              <a:rPr lang="en-GB" altLang="en-US" smtClean="0"/>
+              <a:rPr lang="en-GB" altLang="en-US"/>
               <a:t>    File "&lt;stdin&gt;", line 1, in ? </a:t>
             </a:r>
           </a:p>
@@ -722,7 +722,7 @@
               </a:spcBef>
             </a:pPr>
             <a:r>
-              <a:rPr lang="en-GB" altLang="en-US" smtClean="0"/>
+              <a:rPr lang="en-GB" altLang="en-US"/>
               <a:t>        while True print 'Hello world' </a:t>
             </a:r>
           </a:p>
@@ -733,7 +733,7 @@
               </a:spcBef>
             </a:pPr>
             <a:r>
-              <a:rPr lang="en-GB" altLang="en-US" smtClean="0"/>
+              <a:rPr lang="en-GB" altLang="en-US"/>
               <a:t>                      ^ </a:t>
             </a:r>
           </a:p>
@@ -744,7 +744,7 @@
               </a:spcBef>
             </a:pPr>
             <a:r>
-              <a:rPr lang="en-GB" altLang="en-US" smtClean="0"/>
+              <a:rPr lang="en-GB" altLang="en-US"/>
               <a:t>SyntaxError: invalid syntax </a:t>
             </a:r>
           </a:p>
@@ -754,7 +754,7 @@
                 <a:spcPct val="0"/>
               </a:spcBef>
             </a:pPr>
-            <a:endParaRPr lang="en-GB" altLang="en-US" smtClean="0"/>
+            <a:endParaRPr lang="en-GB" altLang="en-US"/>
           </a:p>
           <a:p>
             <a:pPr eaLnBrk="1" hangingPunct="1">
@@ -763,25 +763,25 @@
               </a:spcBef>
             </a:pPr>
             <a:r>
-              <a:rPr lang="en-GB" altLang="en-US" smtClean="0"/>
+              <a:rPr lang="en-GB" altLang="en-US"/>
               <a:t>The parser repeats the offending line and displays a little 'arrow' pointing at the earliest point in the line where the error was detected. The error is caused by (or at least detected at) the token </a:t>
             </a:r>
             <a:r>
-              <a:rPr lang="en-GB" altLang="en-US" i="1" smtClean="0"/>
+              <a:rPr lang="en-GB" altLang="en-US" i="1"/>
               <a:t>preceding</a:t>
             </a:r>
             <a:r>
-              <a:rPr lang="en-GB" altLang="en-US" smtClean="0"/>
+              <a:rPr lang="en-GB" altLang="en-US"/>
               <a:t> the arrow: in the example, the error is detected at the keyword </a:t>
             </a:r>
             <a:r>
-              <a:rPr lang="en-GB" altLang="en-US" smtClean="0">
+              <a:rPr lang="en-GB" altLang="en-US">
                 <a:hlinkClick r:id="rId3"/>
               </a:rPr>
               <a:t>print</a:t>
             </a:r>
             <a:r>
-              <a:rPr lang="en-GB" altLang="en-US" smtClean="0"/>
+              <a:rPr lang="en-GB" altLang="en-US"/>
               <a:t>, since a colon (':') is missing before it. File name and line number are printed so you know where to look in case the input came from a script.</a:t>
             </a:r>
           </a:p>
@@ -791,7 +791,7 @@
                 <a:spcPct val="0"/>
               </a:spcBef>
             </a:pPr>
-            <a:endParaRPr lang="en-GB" altLang="en-US" smtClean="0"/>
+            <a:endParaRPr lang="en-GB" altLang="en-US"/>
           </a:p>
         </p:txBody>
       </p:sp>
@@ -959,7 +959,7 @@
               </a:pPr>
               <a:t>3</a:t>
             </a:fld>
-            <a:endParaRPr lang="en-GB" altLang="en-US" smtClean="0">
+            <a:endParaRPr lang="en-GB" altLang="en-US">
               <a:latin typeface="Arial" panose="020B0604020202020204" pitchFamily="34" charset="0"/>
             </a:endParaRPr>
           </a:p>
@@ -1066,7 +1066,7 @@
                 <a:spcPct val="0"/>
               </a:spcBef>
             </a:pPr>
-            <a:endParaRPr lang="en-GB" altLang="en-US" smtClean="0"/>
+            <a:endParaRPr lang="en-GB" altLang="en-US"/>
           </a:p>
         </p:txBody>
       </p:sp>
@@ -1234,7 +1234,7 @@
               </a:pPr>
               <a:t>4</a:t>
             </a:fld>
-            <a:endParaRPr lang="en-GB" altLang="en-US" smtClean="0">
+            <a:endParaRPr lang="en-GB" altLang="en-US">
               <a:latin typeface="Arial" panose="020B0604020202020204" pitchFamily="34" charset="0"/>
             </a:endParaRPr>
           </a:p>
@@ -1341,7 +1341,7 @@
                 <a:spcPct val="0"/>
               </a:spcBef>
             </a:pPr>
-            <a:endParaRPr lang="en-GB" altLang="en-US" smtClean="0"/>
+            <a:endParaRPr lang="en-GB" altLang="en-US"/>
           </a:p>
         </p:txBody>
       </p:sp>
@@ -1509,7 +1509,7 @@
               </a:pPr>
               <a:t>5</a:t>
             </a:fld>
-            <a:endParaRPr lang="en-GB" altLang="en-US" smtClean="0">
+            <a:endParaRPr lang="en-GB" altLang="en-US">
               <a:latin typeface="Arial" panose="020B0604020202020204" pitchFamily="34" charset="0"/>
             </a:endParaRPr>
           </a:p>
@@ -1616,7 +1616,7 @@
                 <a:spcPct val="0"/>
               </a:spcBef>
             </a:pPr>
-            <a:endParaRPr lang="en-GB" altLang="en-US" smtClean="0"/>
+            <a:endParaRPr lang="en-GB" altLang="en-US"/>
           </a:p>
         </p:txBody>
       </p:sp>
@@ -1784,7 +1784,7 @@
               </a:pPr>
               <a:t>6</a:t>
             </a:fld>
-            <a:endParaRPr lang="en-GB" altLang="en-US" smtClean="0">
+            <a:endParaRPr lang="en-GB" altLang="en-US">
               <a:latin typeface="Arial" panose="020B0604020202020204" pitchFamily="34" charset="0"/>
             </a:endParaRPr>
           </a:p>
@@ -1891,7 +1891,7 @@
                 <a:spcPct val="0"/>
               </a:spcBef>
             </a:pPr>
-            <a:endParaRPr lang="en-GB" altLang="en-US" smtClean="0"/>
+            <a:endParaRPr lang="en-GB" altLang="en-US"/>
           </a:p>
         </p:txBody>
       </p:sp>
@@ -2059,7 +2059,7 @@
               </a:pPr>
               <a:t>7</a:t>
             </a:fld>
-            <a:endParaRPr lang="en-GB" altLang="en-US" smtClean="0">
+            <a:endParaRPr lang="en-GB" altLang="en-US">
               <a:latin typeface="Arial" panose="020B0604020202020204" pitchFamily="34" charset="0"/>
             </a:endParaRPr>
           </a:p>
@@ -2166,7 +2166,7 @@
                 <a:spcPct val="0"/>
               </a:spcBef>
             </a:pPr>
-            <a:endParaRPr lang="en-GB" altLang="en-US" smtClean="0"/>
+            <a:endParaRPr lang="en-GB" altLang="en-US"/>
           </a:p>
         </p:txBody>
       </p:sp>
@@ -2334,7 +2334,7 @@
               </a:pPr>
               <a:t>8</a:t>
             </a:fld>
-            <a:endParaRPr lang="en-GB" altLang="en-US" smtClean="0">
+            <a:endParaRPr lang="en-GB" altLang="en-US">
               <a:latin typeface="Arial" panose="020B0604020202020204" pitchFamily="34" charset="0"/>
             </a:endParaRPr>
           </a:p>
@@ -2441,7 +2441,7 @@
                 <a:spcPct val="0"/>
               </a:spcBef>
             </a:pPr>
-            <a:endParaRPr lang="en-GB" altLang="en-US" smtClean="0"/>
+            <a:endParaRPr lang="en-GB" altLang="en-US"/>
           </a:p>
           <a:p>
             <a:pPr eaLnBrk="1" hangingPunct="1">
@@ -2450,7 +2450,7 @@
               </a:spcBef>
             </a:pPr>
             <a:r>
-              <a:rPr lang="en-GB" altLang="en-US" smtClean="0"/>
+              <a:rPr lang="en-GB" altLang="en-US"/>
               <a:t>def readIntFromFile(fname):</a:t>
             </a:r>
           </a:p>
@@ -2461,7 +2461,7 @@
               </a:spcBef>
             </a:pPr>
             <a:r>
-              <a:rPr lang="en-GB" altLang="en-US" smtClean="0"/>
+              <a:rPr lang="en-GB" altLang="en-US"/>
               <a:t>    if fname == "c": I_AM_BAD_SYNTAX</a:t>
             </a:r>
           </a:p>
@@ -2472,7 +2472,7 @@
               </a:spcBef>
             </a:pPr>
             <a:r>
-              <a:rPr lang="en-GB" altLang="en-US" smtClean="0"/>
+              <a:rPr lang="en-GB" altLang="en-US"/>
               <a:t>    f = open(fname)</a:t>
             </a:r>
           </a:p>
@@ -2483,7 +2483,7 @@
               </a:spcBef>
             </a:pPr>
             <a:r>
-              <a:rPr lang="en-GB" altLang="en-US" smtClean="0"/>
+              <a:rPr lang="en-GB" altLang="en-US"/>
               <a:t>    i = int(f.read(10))</a:t>
             </a:r>
           </a:p>
@@ -2494,7 +2494,7 @@
               </a:spcBef>
             </a:pPr>
             <a:r>
-              <a:rPr lang="en-GB" altLang="en-US" smtClean="0"/>
+              <a:rPr lang="en-GB" altLang="en-US"/>
               <a:t>    f.close()</a:t>
             </a:r>
           </a:p>
@@ -2505,7 +2505,7 @@
               </a:spcBef>
             </a:pPr>
             <a:r>
-              <a:rPr lang="en-GB" altLang="en-US" smtClean="0"/>
+              <a:rPr lang="en-GB" altLang="en-US"/>
               <a:t>    return i</a:t>
             </a:r>
           </a:p>
@@ -2515,7 +2515,7 @@
                 <a:spcPct val="0"/>
               </a:spcBef>
             </a:pPr>
-            <a:endParaRPr lang="en-GB" altLang="en-US" smtClean="0"/>
+            <a:endParaRPr lang="en-GB" altLang="en-US"/>
           </a:p>
           <a:p>
             <a:pPr eaLnBrk="1" hangingPunct="1">
@@ -2523,7 +2523,7 @@
                 <a:spcPct val="0"/>
               </a:spcBef>
             </a:pPr>
-            <a:endParaRPr lang="en-GB" altLang="en-US" smtClean="0"/>
+            <a:endParaRPr lang="en-GB" altLang="en-US"/>
           </a:p>
           <a:p>
             <a:pPr eaLnBrk="1" hangingPunct="1">
@@ -2532,7 +2532,7 @@
               </a:spcBef>
             </a:pPr>
             <a:r>
-              <a:rPr lang="en-GB" altLang="en-US" smtClean="0"/>
+              <a:rPr lang="en-GB" altLang="en-US"/>
               <a:t>for f in ("a", "b", "c"):</a:t>
             </a:r>
           </a:p>
@@ -2543,7 +2543,7 @@
               </a:spcBef>
             </a:pPr>
             <a:r>
-              <a:rPr lang="en-GB" altLang="en-US" smtClean="0"/>
+              <a:rPr lang="en-GB" altLang="en-US"/>
               <a:t>    try:</a:t>
             </a:r>
           </a:p>
@@ -2554,7 +2554,7 @@
               </a:spcBef>
             </a:pPr>
             <a:r>
-              <a:rPr lang="en-GB" altLang="en-US" smtClean="0"/>
+              <a:rPr lang="en-GB" altLang="en-US"/>
               <a:t>        print readIntFromFile(f)</a:t>
             </a:r>
           </a:p>
@@ -2565,7 +2565,7 @@
               </a:spcBef>
             </a:pPr>
             <a:r>
-              <a:rPr lang="en-GB" altLang="en-US" smtClean="0"/>
+              <a:rPr lang="en-GB" altLang="en-US"/>
               <a:t>    except IOError:</a:t>
             </a:r>
           </a:p>
@@ -2576,7 +2576,7 @@
               </a:spcBef>
             </a:pPr>
             <a:r>
-              <a:rPr lang="en-GB" altLang="en-US" smtClean="0"/>
+              <a:rPr lang="en-GB" altLang="en-US"/>
               <a:t>        print "There is nothing in file: %s" % f</a:t>
             </a:r>
           </a:p>
@@ -2587,7 +2587,7 @@
               </a:spcBef>
             </a:pPr>
             <a:r>
-              <a:rPr lang="en-GB" altLang="en-US" smtClean="0"/>
+              <a:rPr lang="en-GB" altLang="en-US"/>
               <a:t>    except ValueError:</a:t>
             </a:r>
           </a:p>
@@ -2598,7 +2598,7 @@
               </a:spcBef>
             </a:pPr>
             <a:r>
-              <a:rPr lang="en-GB" altLang="en-US" smtClean="0"/>
+              <a:rPr lang="en-GB" altLang="en-US"/>
               <a:t>        print "The contents is not an integer: %s" % f</a:t>
             </a:r>
           </a:p>
@@ -2609,7 +2609,7 @@
               </a:spcBef>
             </a:pPr>
             <a:r>
-              <a:rPr lang="en-GB" altLang="en-US" smtClean="0"/>
+              <a:rPr lang="en-GB" altLang="en-US"/>
               <a:t>    except Exception, err:</a:t>
             </a:r>
           </a:p>
@@ -2620,7 +2620,7 @@
               </a:spcBef>
             </a:pPr>
             <a:r>
-              <a:rPr lang="en-GB" altLang="en-US" smtClean="0"/>
+              <a:rPr lang="en-GB" altLang="en-US"/>
               <a:t>        raise</a:t>
             </a:r>
           </a:p>
@@ -2631,7 +2631,7 @@
               </a:spcBef>
             </a:pPr>
             <a:r>
-              <a:rPr lang="en-GB" altLang="en-US" smtClean="0"/>
+              <a:rPr lang="en-GB" altLang="en-US"/>
               <a:t>~</a:t>
             </a:r>
           </a:p>
@@ -2801,7 +2801,7 @@
               </a:pPr>
               <a:t>9</a:t>
             </a:fld>
-            <a:endParaRPr lang="en-GB" altLang="en-US" smtClean="0">
+            <a:endParaRPr lang="en-GB" altLang="en-US">
               <a:latin typeface="Arial" panose="020B0604020202020204" pitchFamily="34" charset="0"/>
             </a:endParaRPr>
           </a:p>
@@ -2908,7 +2908,7 @@
                 <a:spcPct val="0"/>
               </a:spcBef>
             </a:pPr>
-            <a:endParaRPr lang="en-GB" altLang="en-US" smtClean="0"/>
+            <a:endParaRPr lang="en-GB" altLang="en-US"/>
           </a:p>
           <a:p>
             <a:pPr eaLnBrk="1" hangingPunct="1">
@@ -2917,7 +2917,7 @@
               </a:spcBef>
             </a:pPr>
             <a:r>
-              <a:rPr lang="en-GB" altLang="en-US" smtClean="0"/>
+              <a:rPr lang="en-GB" altLang="en-US"/>
               <a:t>def readIntFromFile(fname):</a:t>
             </a:r>
           </a:p>
@@ -2928,7 +2928,7 @@
               </a:spcBef>
             </a:pPr>
             <a:r>
-              <a:rPr lang="en-GB" altLang="en-US" smtClean="0"/>
+              <a:rPr lang="en-GB" altLang="en-US"/>
               <a:t>    if fname == "c": I_AM_BAD_SYNTAX</a:t>
             </a:r>
           </a:p>
@@ -2939,7 +2939,7 @@
               </a:spcBef>
             </a:pPr>
             <a:r>
-              <a:rPr lang="en-GB" altLang="en-US" smtClean="0"/>
+              <a:rPr lang="en-GB" altLang="en-US"/>
               <a:t>    f = open(fname)</a:t>
             </a:r>
           </a:p>
@@ -2950,7 +2950,7 @@
               </a:spcBef>
             </a:pPr>
             <a:r>
-              <a:rPr lang="en-GB" altLang="en-US" smtClean="0"/>
+              <a:rPr lang="en-GB" altLang="en-US"/>
               <a:t>    i = int(f.read(10))</a:t>
             </a:r>
           </a:p>
@@ -2961,7 +2961,7 @@
               </a:spcBef>
             </a:pPr>
             <a:r>
-              <a:rPr lang="en-GB" altLang="en-US" smtClean="0"/>
+              <a:rPr lang="en-GB" altLang="en-US"/>
               <a:t>    f.close()</a:t>
             </a:r>
           </a:p>
@@ -2972,7 +2972,7 @@
               </a:spcBef>
             </a:pPr>
             <a:r>
-              <a:rPr lang="en-GB" altLang="en-US" smtClean="0"/>
+              <a:rPr lang="en-GB" altLang="en-US"/>
               <a:t>    return i</a:t>
             </a:r>
           </a:p>
@@ -2982,7 +2982,7 @@
                 <a:spcPct val="0"/>
               </a:spcBef>
             </a:pPr>
-            <a:endParaRPr lang="en-GB" altLang="en-US" smtClean="0"/>
+            <a:endParaRPr lang="en-GB" altLang="en-US"/>
           </a:p>
           <a:p>
             <a:pPr eaLnBrk="1" hangingPunct="1">
@@ -2990,7 +2990,7 @@
                 <a:spcPct val="0"/>
               </a:spcBef>
             </a:pPr>
-            <a:endParaRPr lang="en-GB" altLang="en-US" smtClean="0"/>
+            <a:endParaRPr lang="en-GB" altLang="en-US"/>
           </a:p>
           <a:p>
             <a:pPr eaLnBrk="1" hangingPunct="1">
@@ -2999,7 +2999,7 @@
               </a:spcBef>
             </a:pPr>
             <a:r>
-              <a:rPr lang="en-GB" altLang="en-US" smtClean="0"/>
+              <a:rPr lang="en-GB" altLang="en-US"/>
               <a:t>for f in ("a", "b", "c"):</a:t>
             </a:r>
           </a:p>
@@ -3010,7 +3010,7 @@
               </a:spcBef>
             </a:pPr>
             <a:r>
-              <a:rPr lang="en-GB" altLang="en-US" smtClean="0"/>
+              <a:rPr lang="en-GB" altLang="en-US"/>
               <a:t>    try:</a:t>
             </a:r>
           </a:p>
@@ -3021,7 +3021,7 @@
               </a:spcBef>
             </a:pPr>
             <a:r>
-              <a:rPr lang="en-GB" altLang="en-US" smtClean="0"/>
+              <a:rPr lang="en-GB" altLang="en-US"/>
               <a:t>        print readIntFromFile(f)</a:t>
             </a:r>
           </a:p>
@@ -3032,7 +3032,7 @@
               </a:spcBef>
             </a:pPr>
             <a:r>
-              <a:rPr lang="en-GB" altLang="en-US" smtClean="0"/>
+              <a:rPr lang="en-GB" altLang="en-US"/>
               <a:t>    except IOError:</a:t>
             </a:r>
           </a:p>
@@ -3043,7 +3043,7 @@
               </a:spcBef>
             </a:pPr>
             <a:r>
-              <a:rPr lang="en-GB" altLang="en-US" smtClean="0"/>
+              <a:rPr lang="en-GB" altLang="en-US"/>
               <a:t>        print "There is nothing in file: %s" % f</a:t>
             </a:r>
           </a:p>
@@ -3054,7 +3054,7 @@
               </a:spcBef>
             </a:pPr>
             <a:r>
-              <a:rPr lang="en-GB" altLang="en-US" smtClean="0"/>
+              <a:rPr lang="en-GB" altLang="en-US"/>
               <a:t>    except ValueError:</a:t>
             </a:r>
           </a:p>
@@ -3065,7 +3065,7 @@
               </a:spcBef>
             </a:pPr>
             <a:r>
-              <a:rPr lang="en-GB" altLang="en-US" smtClean="0"/>
+              <a:rPr lang="en-GB" altLang="en-US"/>
               <a:t>        print "The contents is not an integer: %s" % f</a:t>
             </a:r>
           </a:p>
@@ -3076,7 +3076,7 @@
               </a:spcBef>
             </a:pPr>
             <a:r>
-              <a:rPr lang="en-GB" altLang="en-US" smtClean="0"/>
+              <a:rPr lang="en-GB" altLang="en-US"/>
               <a:t>    except Exception, err:</a:t>
             </a:r>
           </a:p>
@@ -3087,7 +3087,7 @@
               </a:spcBef>
             </a:pPr>
             <a:r>
-              <a:rPr lang="en-GB" altLang="en-US" smtClean="0"/>
+              <a:rPr lang="en-GB" altLang="en-US"/>
               <a:t>        raise</a:t>
             </a:r>
           </a:p>
@@ -3098,7 +3098,7 @@
               </a:spcBef>
             </a:pPr>
             <a:r>
-              <a:rPr lang="en-GB" altLang="en-US" smtClean="0"/>
+              <a:rPr lang="en-GB" altLang="en-US"/>
               <a:t>~</a:t>
             </a:r>
           </a:p>
@@ -3268,7 +3268,7 @@
               </a:pPr>
               <a:t>10</a:t>
             </a:fld>
-            <a:endParaRPr lang="en-GB" altLang="en-US" smtClean="0">
+            <a:endParaRPr lang="en-GB" altLang="en-US">
               <a:latin typeface="Arial" panose="020B0604020202020204" pitchFamily="34" charset="0"/>
             </a:endParaRPr>
           </a:p>
@@ -3495,7 +3495,7 @@
           </a:lstStyle>
           <a:p>
             <a:r>
-              <a:rPr lang="en-US" smtClean="0"/>
+              <a:rPr lang="en-US"/>
               <a:t>Click to edit Master title style</a:t>
             </a:r>
             <a:endParaRPr lang="en-US" dirty="0"/>
@@ -3571,7 +3571,7 @@
           </a:lstStyle>
           <a:p>
             <a:r>
-              <a:rPr lang="en-US" smtClean="0"/>
+              <a:rPr lang="en-US"/>
               <a:t>Click to edit Master subtitle style</a:t>
             </a:r>
             <a:endParaRPr lang="en-US" dirty="0"/>
@@ -3640,7 +3640,7 @@
           </a:lstStyle>
           <a:p>
             <a:r>
-              <a:rPr lang="en-US" smtClean="0"/>
+              <a:rPr lang="en-US"/>
               <a:t>Click to edit Master title style</a:t>
             </a:r>
             <a:endParaRPr lang="en-US" dirty="0"/>
@@ -3714,7 +3714,7 @@
           </a:lstStyle>
           <a:p>
             <a:r>
-              <a:rPr lang="en-US" smtClean="0"/>
+              <a:rPr lang="en-US"/>
               <a:t>Click to edit Master subtitle style</a:t>
             </a:r>
             <a:endParaRPr lang="en-US" dirty="0"/>
@@ -3761,7 +3761,7 @@
           <a:p>
             <a:pPr lvl="0"/>
             <a:r>
-              <a:rPr lang="en-US" noProof="0" smtClean="0"/>
+              <a:rPr lang="en-US" noProof="0"/>
               <a:t>Click icon to add picture</a:t>
             </a:r>
             <a:endParaRPr lang="en-GB" noProof="0" dirty="0"/>
@@ -3809,7 +3809,7 @@
               <a:pPr>
                 <a:defRPr/>
               </a:pPr>
-              <a:t>18/12/2018</a:t>
+              <a:t>18/10/2021</a:t>
             </a:fld>
             <a:endParaRPr lang="en-GB"/>
           </a:p>
@@ -3877,7 +3877,7 @@
           </a:lstStyle>
           <a:p>
             <a:r>
-              <a:rPr lang="en-US" smtClean="0"/>
+              <a:rPr lang="en-US"/>
               <a:t>Click to edit Master title style</a:t>
             </a:r>
             <a:endParaRPr lang="en-US" dirty="0"/>
@@ -3951,7 +3951,7 @@
           </a:lstStyle>
           <a:p>
             <a:r>
-              <a:rPr lang="en-US" smtClean="0"/>
+              <a:rPr lang="en-US"/>
               <a:t>Click to edit Master subtitle style</a:t>
             </a:r>
             <a:endParaRPr lang="en-US" dirty="0"/>
@@ -3998,7 +3998,7 @@
           <a:p>
             <a:pPr lvl="0"/>
             <a:r>
-              <a:rPr lang="en-US" noProof="0" smtClean="0"/>
+              <a:rPr lang="en-US" noProof="0"/>
               <a:t>Click icon to add picture</a:t>
             </a:r>
             <a:endParaRPr lang="en-GB" noProof="0" dirty="0"/>
@@ -4046,7 +4046,7 @@
               <a:pPr>
                 <a:defRPr/>
               </a:pPr>
-              <a:t>18/12/2018</a:t>
+              <a:t>18/10/2021</a:t>
             </a:fld>
             <a:endParaRPr lang="en-GB"/>
           </a:p>
@@ -4149,7 +4149,7 @@
           </a:lstStyle>
           <a:p>
             <a:r>
-              <a:rPr lang="en-US" smtClean="0"/>
+              <a:rPr lang="en-US"/>
               <a:t>Click to edit Master title style</a:t>
             </a:r>
             <a:endParaRPr lang="en-US" dirty="0"/>
@@ -4196,7 +4196,7 @@
           <a:p>
             <a:pPr lvl="0"/>
             <a:r>
-              <a:rPr lang="en-US" noProof="0" smtClean="0"/>
+              <a:rPr lang="en-US" noProof="0"/>
               <a:t>Click icon to add picture</a:t>
             </a:r>
             <a:endParaRPr lang="en-GB" noProof="0" dirty="0"/>
@@ -4252,35 +4252,35 @@
           <a:p>
             <a:pPr lvl="0"/>
             <a:r>
-              <a:rPr lang="en-US" smtClean="0"/>
+              <a:rPr lang="en-US"/>
               <a:t>Edit Master text styles</a:t>
             </a:r>
           </a:p>
           <a:p>
             <a:pPr lvl="1"/>
             <a:r>
-              <a:rPr lang="en-US" smtClean="0"/>
+              <a:rPr lang="en-US"/>
               <a:t>Second level</a:t>
             </a:r>
           </a:p>
           <a:p>
             <a:pPr lvl="2"/>
             <a:r>
-              <a:rPr lang="en-US" smtClean="0"/>
+              <a:rPr lang="en-US"/>
               <a:t>Third level</a:t>
             </a:r>
           </a:p>
           <a:p>
             <a:pPr lvl="3"/>
             <a:r>
-              <a:rPr lang="en-US" smtClean="0"/>
+              <a:rPr lang="en-US"/>
               <a:t>Fourth level</a:t>
             </a:r>
           </a:p>
           <a:p>
             <a:pPr lvl="4"/>
             <a:r>
-              <a:rPr lang="en-US" smtClean="0"/>
+              <a:rPr lang="en-US"/>
               <a:t>Fifth level</a:t>
             </a:r>
             <a:endParaRPr lang="en-US" dirty="0"/>
@@ -4384,7 +4384,7 @@
           </a:lstStyle>
           <a:p>
             <a:r>
-              <a:rPr lang="en-US" smtClean="0"/>
+              <a:rPr lang="en-US"/>
               <a:t>Click to edit Master title style</a:t>
             </a:r>
             <a:endParaRPr lang="en-US" dirty="0"/>
@@ -4440,35 +4440,35 @@
           <a:p>
             <a:pPr lvl="0"/>
             <a:r>
-              <a:rPr lang="en-US" smtClean="0"/>
+              <a:rPr lang="en-US"/>
               <a:t>Edit Master text styles</a:t>
             </a:r>
           </a:p>
           <a:p>
             <a:pPr lvl="1"/>
             <a:r>
-              <a:rPr lang="en-US" smtClean="0"/>
+              <a:rPr lang="en-US"/>
               <a:t>Second level</a:t>
             </a:r>
           </a:p>
           <a:p>
             <a:pPr lvl="2"/>
             <a:r>
-              <a:rPr lang="en-US" smtClean="0"/>
+              <a:rPr lang="en-US"/>
               <a:t>Third level</a:t>
             </a:r>
           </a:p>
           <a:p>
             <a:pPr lvl="3"/>
             <a:r>
-              <a:rPr lang="en-US" smtClean="0"/>
+              <a:rPr lang="en-US"/>
               <a:t>Fourth level</a:t>
             </a:r>
           </a:p>
           <a:p>
             <a:pPr lvl="4"/>
             <a:r>
-              <a:rPr lang="en-US" smtClean="0"/>
+              <a:rPr lang="en-US"/>
               <a:t>Fifth level</a:t>
             </a:r>
             <a:endParaRPr lang="en-US" dirty="0"/>
@@ -4549,7 +4549,7 @@
           </a:lstStyle>
           <a:p>
             <a:r>
-              <a:rPr lang="en-US" smtClean="0"/>
+              <a:rPr lang="en-US"/>
               <a:t>Click to edit Master title style</a:t>
             </a:r>
             <a:endParaRPr lang="en-US" dirty="0"/>
@@ -4623,7 +4623,7 @@
           </a:lstStyle>
           <a:p>
             <a:r>
-              <a:rPr lang="en-US" smtClean="0"/>
+              <a:rPr lang="en-US"/>
               <a:t>Click to edit Master subtitle style</a:t>
             </a:r>
             <a:endParaRPr lang="en-US" dirty="0"/>
@@ -4676,7 +4676,7 @@
           <a:lstStyle/>
           <a:p>
             <a:r>
-              <a:rPr lang="en-US" smtClean="0"/>
+              <a:rPr lang="en-US"/>
               <a:t>Click to edit Master title style</a:t>
             </a:r>
             <a:endParaRPr lang="en-GB"/>
@@ -4700,35 +4700,35 @@
           <a:p>
             <a:pPr lvl="0"/>
             <a:r>
-              <a:rPr lang="en-US" smtClean="0"/>
+              <a:rPr lang="en-US"/>
               <a:t>Click to edit Master text styles</a:t>
             </a:r>
           </a:p>
           <a:p>
             <a:pPr lvl="1"/>
             <a:r>
-              <a:rPr lang="en-US" smtClean="0"/>
+              <a:rPr lang="en-US"/>
               <a:t>Second level</a:t>
             </a:r>
           </a:p>
           <a:p>
             <a:pPr lvl="2"/>
             <a:r>
-              <a:rPr lang="en-US" smtClean="0"/>
+              <a:rPr lang="en-US"/>
               <a:t>Third level</a:t>
             </a:r>
           </a:p>
           <a:p>
             <a:pPr lvl="3"/>
             <a:r>
-              <a:rPr lang="en-US" smtClean="0"/>
+              <a:rPr lang="en-US"/>
               <a:t>Fourth level</a:t>
             </a:r>
           </a:p>
           <a:p>
             <a:pPr lvl="4"/>
             <a:r>
-              <a:rPr lang="en-US" smtClean="0"/>
+              <a:rPr lang="en-US"/>
               <a:t>Fifth level</a:t>
             </a:r>
             <a:endParaRPr lang="en-GB"/>
@@ -4767,7 +4767,7 @@
               <a:pPr>
                 <a:defRPr/>
               </a:pPr>
-              <a:t>18/12/2018</a:t>
+              <a:t>18/10/2021</a:t>
             </a:fld>
             <a:endParaRPr lang="en-GB"/>
           </a:p>
@@ -5098,35 +5098,35 @@
           <a:p>
             <a:pPr lvl="0"/>
             <a:r>
-              <a:rPr lang="en-US" altLang="en-US" smtClean="0"/>
+              <a:rPr lang="en-US" altLang="en-US"/>
               <a:t>Edit Master text styles</a:t>
             </a:r>
           </a:p>
           <a:p>
             <a:pPr lvl="1"/>
             <a:r>
-              <a:rPr lang="en-US" altLang="en-US" smtClean="0"/>
+              <a:rPr lang="en-US" altLang="en-US"/>
               <a:t>Second level</a:t>
             </a:r>
           </a:p>
           <a:p>
             <a:pPr lvl="2"/>
             <a:r>
-              <a:rPr lang="en-US" altLang="en-US" smtClean="0"/>
+              <a:rPr lang="en-US" altLang="en-US"/>
               <a:t>Third level</a:t>
             </a:r>
           </a:p>
           <a:p>
             <a:pPr lvl="3"/>
             <a:r>
-              <a:rPr lang="en-US" altLang="en-US" smtClean="0"/>
+              <a:rPr lang="en-US" altLang="en-US"/>
               <a:t>Fourth level</a:t>
             </a:r>
           </a:p>
           <a:p>
             <a:pPr lvl="4"/>
             <a:r>
-              <a:rPr lang="en-US" altLang="en-US" smtClean="0"/>
+              <a:rPr lang="en-US" altLang="en-US"/>
               <a:t>Fifth level</a:t>
             </a:r>
           </a:p>
@@ -5340,10 +5340,10 @@
           <a:p>
             <a:pPr lvl="0"/>
             <a:r>
-              <a:rPr lang="en-US" altLang="en-US" smtClean="0"/>
+              <a:rPr lang="en-US" altLang="en-US"/>
               <a:t>Click to edit Master title style</a:t>
             </a:r>
-            <a:endParaRPr lang="en-GB" altLang="en-US" smtClean="0"/>
+            <a:endParaRPr lang="en-GB" altLang="en-US"/>
           </a:p>
         </p:txBody>
       </p:sp>
@@ -5895,7 +5895,7 @@
           <a:lstStyle/>
           <a:p>
             <a:r>
-              <a:rPr lang="en-GB" altLang="en-US" smtClean="0"/>
+              <a:rPr lang="en-GB" altLang="en-US"/>
               <a:t>Python</a:t>
             </a:r>
           </a:p>
@@ -5922,7 +5922,7 @@
           <a:lstStyle/>
           <a:p>
             <a:r>
-              <a:rPr lang="en-GB" altLang="en-US" smtClean="0"/>
+              <a:rPr lang="en-GB" altLang="en-US"/>
               <a:t>Errors and Exceptions</a:t>
             </a:r>
           </a:p>
@@ -5933,13 +5933,6 @@
   <p:clrMapOvr>
     <a:masterClrMapping/>
   </p:clrMapOvr>
-  <p:timing>
-    <p:tnLst>
-      <p:par>
-        <p:cTn id="1" dur="indefinite" restart="never" nodeType="tmRoot"/>
-      </p:par>
-    </p:tnLst>
-  </p:timing>
 </p:sld>
 </file>
 
@@ -5976,7 +5969,7 @@
           <a:lstStyle/>
           <a:p>
             <a:r>
-              <a:rPr lang="en-GB" altLang="en-US" b="1" smtClean="0"/>
+              <a:rPr lang="en-GB" altLang="en-US" b="1"/>
               <a:t>An example continued</a:t>
             </a:r>
           </a:p>
@@ -6007,28 +6000,28 @@
               <a:buNone/>
             </a:pPr>
             <a:r>
-              <a:rPr lang="en-GB" altLang="en-US" sz="2000" b="1" dirty="0" smtClean="0">
+              <a:rPr lang="en-GB" altLang="en-US" sz="2000" b="1" dirty="0">
                 <a:latin typeface="Courier New" panose="02070309020205020404" pitchFamily="49" charset="0"/>
                 <a:cs typeface="Courier New" panose="02070309020205020404" pitchFamily="49" charset="0"/>
               </a:rPr>
               <a:t>for</a:t>
             </a:r>
             <a:r>
-              <a:rPr lang="en-GB" altLang="en-US" sz="2000" dirty="0" smtClean="0">
+              <a:rPr lang="en-GB" altLang="en-US" sz="2000" dirty="0">
                 <a:latin typeface="Courier New" panose="02070309020205020404" pitchFamily="49" charset="0"/>
                 <a:cs typeface="Courier New" panose="02070309020205020404" pitchFamily="49" charset="0"/>
               </a:rPr>
-              <a:t> f </a:t>
-            </a:r>
-            <a:r>
-              <a:rPr lang="en-GB" altLang="en-US" sz="2000" b="1" dirty="0" smtClean="0">
+              <a:t> file </a:t>
+            </a:r>
+            <a:r>
+              <a:rPr lang="en-GB" altLang="en-US" sz="2000" b="1" dirty="0">
                 <a:latin typeface="Courier New" panose="02070309020205020404" pitchFamily="49" charset="0"/>
                 <a:cs typeface="Courier New" panose="02070309020205020404" pitchFamily="49" charset="0"/>
               </a:rPr>
               <a:t>in</a:t>
             </a:r>
             <a:r>
-              <a:rPr lang="en-GB" altLang="en-US" sz="2000" dirty="0" smtClean="0">
+              <a:rPr lang="en-GB" altLang="en-US" sz="2000" dirty="0">
                 <a:latin typeface="Courier New" panose="02070309020205020404" pitchFamily="49" charset="0"/>
                 <a:cs typeface="Courier New" panose="02070309020205020404" pitchFamily="49" charset="0"/>
               </a:rPr>
@@ -6041,7 +6034,7 @@
               <a:buNone/>
             </a:pPr>
             <a:r>
-              <a:rPr lang="en-GB" altLang="en-US" sz="2000" b="1" dirty="0" smtClean="0">
+              <a:rPr lang="en-GB" altLang="en-US" sz="2000" b="1" dirty="0">
                 <a:latin typeface="Courier New" panose="02070309020205020404" pitchFamily="49" charset="0"/>
                 <a:cs typeface="Courier New" panose="02070309020205020404" pitchFamily="49" charset="0"/>
               </a:rPr>
@@ -6052,25 +6045,25 @@
             <a:pPr marL="0" indent="0">
               <a:buNone/>
             </a:pPr>
-            <a:r>
-              <a:rPr lang="en-GB" altLang="en-US" sz="2000" dirty="0" smtClean="0">
-                <a:latin typeface="Courier New" panose="02070309020205020404" pitchFamily="49" charset="0"/>
-                <a:cs typeface="Courier New" panose="02070309020205020404" pitchFamily="49" charset="0"/>
-              </a:rPr>
-              <a:t>        </a:t>
-            </a:r>
-            <a:r>
-              <a:rPr lang="en-GB" altLang="en-US" sz="2000" b="1" dirty="0" smtClean="0">
-                <a:latin typeface="Courier New" panose="02070309020205020404" pitchFamily="49" charset="0"/>
-                <a:cs typeface="Courier New" panose="02070309020205020404" pitchFamily="49" charset="0"/>
-              </a:rPr>
-              <a:t>print</a:t>
-            </a:r>
             <a:r>
               <a:rPr lang="en-GB" altLang="en-US" sz="2000" dirty="0">
                 <a:latin typeface="Courier New" panose="02070309020205020404" pitchFamily="49" charset="0"/>
                 <a:cs typeface="Courier New" panose="02070309020205020404" pitchFamily="49" charset="0"/>
               </a:rPr>
+              <a:t>        </a:t>
+            </a:r>
+            <a:r>
+              <a:rPr lang="en-GB" altLang="en-US" sz="2000" b="1" dirty="0">
+                <a:latin typeface="Courier New" panose="02070309020205020404" pitchFamily="49" charset="0"/>
+                <a:cs typeface="Courier New" panose="02070309020205020404" pitchFamily="49" charset="0"/>
+              </a:rPr>
+              <a:t>print</a:t>
+            </a:r>
+            <a:r>
+              <a:rPr lang="en-GB" altLang="en-US" sz="2000" dirty="0">
+                <a:latin typeface="Courier New" panose="02070309020205020404" pitchFamily="49" charset="0"/>
+                <a:cs typeface="Courier New" panose="02070309020205020404" pitchFamily="49" charset="0"/>
+              </a:rPr>
               <a:t>(</a:t>
             </a:r>
             <a:r>
@@ -6085,14 +6078,7 @@
                 <a:latin typeface="Courier New" panose="02070309020205020404" pitchFamily="49" charset="0"/>
                 <a:cs typeface="Courier New" panose="02070309020205020404" pitchFamily="49" charset="0"/>
               </a:rPr>
-              <a:t>(f</a:t>
-            </a:r>
-            <a:r>
-              <a:rPr lang="en-GB" altLang="en-US" sz="2000" dirty="0" smtClean="0">
-                <a:latin typeface="Courier New" panose="02070309020205020404" pitchFamily="49" charset="0"/>
-                <a:cs typeface="Courier New" panose="02070309020205020404" pitchFamily="49" charset="0"/>
-              </a:rPr>
-              <a:t>))</a:t>
+              <a:t>(file))</a:t>
             </a:r>
           </a:p>
           <a:p>
@@ -6101,25 +6087,65 @@
               <a:buNone/>
             </a:pPr>
             <a:r>
-              <a:rPr lang="en-GB" altLang="en-US" sz="2000" b="1" dirty="0" smtClean="0">
+              <a:rPr lang="en-GB" altLang="en-US" sz="2000" b="1" dirty="0">
                 <a:latin typeface="Courier New" panose="02070309020205020404" pitchFamily="49" charset="0"/>
                 <a:cs typeface="Courier New" panose="02070309020205020404" pitchFamily="49" charset="0"/>
               </a:rPr>
               <a:t>    except </a:t>
             </a:r>
             <a:r>
-              <a:rPr lang="en-GB" altLang="en-US" sz="2000" dirty="0" err="1" smtClean="0">
+              <a:rPr lang="en-GB" altLang="en-US" sz="2000" dirty="0" err="1">
                 <a:latin typeface="Courier New" panose="02070309020205020404" pitchFamily="49" charset="0"/>
                 <a:cs typeface="Courier New" panose="02070309020205020404" pitchFamily="49" charset="0"/>
               </a:rPr>
               <a:t>IOError</a:t>
             </a:r>
             <a:r>
-              <a:rPr lang="en-GB" altLang="en-US" sz="2000" b="1" dirty="0" smtClean="0">
+              <a:rPr lang="en-GB" altLang="en-US" sz="2000" b="1" dirty="0">
                 <a:latin typeface="Courier New" panose="02070309020205020404" pitchFamily="49" charset="0"/>
                 <a:cs typeface="Courier New" panose="02070309020205020404" pitchFamily="49" charset="0"/>
               </a:rPr>
               <a:t>:</a:t>
+            </a:r>
+          </a:p>
+          <a:p>
+            <a:pPr marL="0" indent="0">
+              <a:buNone/>
+            </a:pPr>
+            <a:r>
+              <a:rPr lang="en-GB" altLang="en-US" sz="2000" dirty="0">
+                <a:latin typeface="Courier New" panose="02070309020205020404" pitchFamily="49" charset="0"/>
+                <a:cs typeface="Courier New" panose="02070309020205020404" pitchFamily="49" charset="0"/>
+              </a:rPr>
+              <a:t>        </a:t>
+            </a:r>
+            <a:r>
+              <a:rPr lang="en-GB" altLang="en-US" sz="2000" b="1" dirty="0">
+                <a:latin typeface="Courier New" panose="02070309020205020404" pitchFamily="49" charset="0"/>
+                <a:cs typeface="Courier New" panose="02070309020205020404" pitchFamily="49" charset="0"/>
+              </a:rPr>
+              <a:t>print</a:t>
+            </a:r>
+            <a:r>
+              <a:rPr lang="en-GB" altLang="en-US" sz="2000" dirty="0">
+                <a:latin typeface="Courier New" panose="02070309020205020404" pitchFamily="49" charset="0"/>
+                <a:cs typeface="Courier New" panose="02070309020205020404" pitchFamily="49" charset="0"/>
+              </a:rPr>
+              <a:t>(</a:t>
+            </a:r>
+            <a:r>
+              <a:rPr lang="en-GB" altLang="en-US" sz="2000" dirty="0" err="1">
+                <a:latin typeface="Courier New" panose="02070309020205020404" pitchFamily="49" charset="0"/>
+                <a:cs typeface="Courier New" panose="02070309020205020404" pitchFamily="49" charset="0"/>
+              </a:rPr>
+              <a:t>f"There</a:t>
+            </a:r>
+            <a:r>
+              <a:rPr lang="en-GB" altLang="en-US" sz="2000" dirty="0">
+                <a:latin typeface="Courier New" panose="02070309020205020404" pitchFamily="49" charset="0"/>
+                <a:cs typeface="Courier New" panose="02070309020205020404" pitchFamily="49" charset="0"/>
+              </a:rPr>
+              <a:t> is nothing in file: {file}")</a:t>
             </a:r>
           </a:p>
           <a:p>
@@ -6128,25 +6154,65 @@
               <a:buNone/>
             </a:pPr>
             <a:r>
-              <a:rPr lang="en-GB" altLang="en-US" sz="2000" dirty="0" smtClean="0">
+              <a:rPr lang="en-GB" altLang="en-US" sz="2000" b="1" dirty="0">
                 <a:latin typeface="Courier New" panose="02070309020205020404" pitchFamily="49" charset="0"/>
                 <a:cs typeface="Courier New" panose="02070309020205020404" pitchFamily="49" charset="0"/>
               </a:rPr>
-              <a:t>        </a:t>
-            </a:r>
-            <a:r>
-              <a:rPr lang="en-GB" altLang="en-US" sz="2000" b="1" dirty="0" smtClean="0">
+              <a:t>    except </a:t>
+            </a:r>
+            <a:r>
+              <a:rPr lang="en-GB" altLang="en-US" sz="2000" dirty="0" err="1">
                 <a:latin typeface="Courier New" panose="02070309020205020404" pitchFamily="49" charset="0"/>
                 <a:cs typeface="Courier New" panose="02070309020205020404" pitchFamily="49" charset="0"/>
               </a:rPr>
-              <a:t>print</a:t>
-            </a:r>
-            <a:r>
-              <a:rPr lang="en-GB" altLang="en-US" sz="2000" dirty="0" smtClean="0">
+              <a:t>ValueError</a:t>
+            </a:r>
+            <a:r>
+              <a:rPr lang="en-GB" altLang="en-US" sz="2000" b="1" dirty="0">
                 <a:latin typeface="Courier New" panose="02070309020205020404" pitchFamily="49" charset="0"/>
                 <a:cs typeface="Courier New" panose="02070309020205020404" pitchFamily="49" charset="0"/>
               </a:rPr>
-              <a:t>("There is nothing in file: {0}".format(f))</a:t>
+              <a:t>:</a:t>
+            </a:r>
+          </a:p>
+          <a:p>
+            <a:pPr marL="0" indent="0">
+              <a:buNone/>
+            </a:pPr>
+            <a:r>
+              <a:rPr lang="en-GB" altLang="en-US" sz="2000" dirty="0">
+                <a:latin typeface="Courier New" panose="02070309020205020404" pitchFamily="49" charset="0"/>
+                <a:cs typeface="Courier New" panose="02070309020205020404" pitchFamily="49" charset="0"/>
+              </a:rPr>
+              <a:t>        </a:t>
+            </a:r>
+            <a:r>
+              <a:rPr lang="en-GB" altLang="en-US" sz="2000" b="1" dirty="0">
+                <a:latin typeface="Courier New" panose="02070309020205020404" pitchFamily="49" charset="0"/>
+                <a:cs typeface="Courier New" panose="02070309020205020404" pitchFamily="49" charset="0"/>
+              </a:rPr>
+              <a:t>print</a:t>
+            </a:r>
+            <a:r>
+              <a:rPr lang="en-GB" altLang="en-US" sz="2000" dirty="0">
+                <a:latin typeface="Courier New" panose="02070309020205020404" pitchFamily="49" charset="0"/>
+                <a:cs typeface="Courier New" panose="02070309020205020404" pitchFamily="49" charset="0"/>
+              </a:rPr>
+              <a:t>(</a:t>
+            </a:r>
+            <a:r>
+              <a:rPr lang="en-GB" altLang="en-US" sz="2000" dirty="0" err="1">
+                <a:latin typeface="Courier New" panose="02070309020205020404" pitchFamily="49" charset="0"/>
+                <a:cs typeface="Courier New" panose="02070309020205020404" pitchFamily="49" charset="0"/>
+              </a:rPr>
+              <a:t>f"Could</a:t>
+            </a:r>
+            <a:r>
+              <a:rPr lang="en-GB" altLang="en-US" sz="2000" dirty="0">
+                <a:latin typeface="Courier New" panose="02070309020205020404" pitchFamily="49" charset="0"/>
+                <a:cs typeface="Courier New" panose="02070309020205020404" pitchFamily="49" charset="0"/>
+              </a:rPr>
+              <a:t> not convert to int: {file}")</a:t>
             </a:r>
           </a:p>
           <a:p>
@@ -6155,21 +6221,35 @@
               <a:buNone/>
             </a:pPr>
             <a:r>
-              <a:rPr lang="en-GB" altLang="en-US" sz="2000" b="1" dirty="0" smtClean="0">
+              <a:rPr lang="en-GB" altLang="en-US" sz="2000" b="1" dirty="0">
                 <a:latin typeface="Courier New" panose="02070309020205020404" pitchFamily="49" charset="0"/>
                 <a:cs typeface="Courier New" panose="02070309020205020404" pitchFamily="49" charset="0"/>
               </a:rPr>
               <a:t>    except </a:t>
             </a:r>
             <a:r>
-              <a:rPr lang="en-GB" altLang="en-US" sz="2000" dirty="0" err="1" smtClean="0">
+              <a:rPr lang="en-GB" altLang="en-US" sz="2000" dirty="0">
                 <a:latin typeface="Courier New" panose="02070309020205020404" pitchFamily="49" charset="0"/>
                 <a:cs typeface="Courier New" panose="02070309020205020404" pitchFamily="49" charset="0"/>
               </a:rPr>
-              <a:t>ValueError</a:t>
-            </a:r>
-            <a:r>
-              <a:rPr lang="en-GB" altLang="en-US" sz="2000" b="1" dirty="0" smtClean="0">
+              <a:t>Exception </a:t>
+            </a:r>
+            <a:r>
+              <a:rPr lang="en-GB" altLang="en-US" sz="2000" b="1" dirty="0">
+                <a:latin typeface="Courier New" panose="02070309020205020404" pitchFamily="49" charset="0"/>
+                <a:cs typeface="Courier New" panose="02070309020205020404" pitchFamily="49" charset="0"/>
+              </a:rPr>
+              <a:t>as</a:t>
+            </a:r>
+            <a:r>
+              <a:rPr lang="en-GB" altLang="en-US" sz="2000" dirty="0">
+                <a:latin typeface="Courier New" panose="02070309020205020404" pitchFamily="49" charset="0"/>
+                <a:cs typeface="Courier New" panose="02070309020205020404" pitchFamily="49" charset="0"/>
+              </a:rPr>
+              <a:t> err</a:t>
+            </a:r>
+            <a:r>
+              <a:rPr lang="en-GB" altLang="en-US" sz="2000" b="1" dirty="0">
                 <a:latin typeface="Courier New" panose="02070309020205020404" pitchFamily="49" charset="0"/>
                 <a:cs typeface="Courier New" panose="02070309020205020404" pitchFamily="49" charset="0"/>
               </a:rPr>
@@ -6182,39 +6262,39 @@
               <a:buNone/>
             </a:pPr>
             <a:r>
-              <a:rPr lang="en-GB" altLang="en-US" sz="2000" dirty="0" smtClean="0">
+              <a:rPr lang="en-GB" altLang="en-US" sz="2000" dirty="0">
                 <a:latin typeface="Courier New" panose="02070309020205020404" pitchFamily="49" charset="0"/>
                 <a:cs typeface="Courier New" panose="02070309020205020404" pitchFamily="49" charset="0"/>
               </a:rPr>
               <a:t>        </a:t>
             </a:r>
             <a:r>
-              <a:rPr lang="en-GB" altLang="en-US" sz="2000" b="1" dirty="0" smtClean="0">
+              <a:rPr lang="en-GB" altLang="en-US" sz="2000" b="1" dirty="0">
                 <a:latin typeface="Courier New" panose="02070309020205020404" pitchFamily="49" charset="0"/>
                 <a:cs typeface="Courier New" panose="02070309020205020404" pitchFamily="49" charset="0"/>
               </a:rPr>
               <a:t>print</a:t>
             </a:r>
             <a:r>
-              <a:rPr lang="en-GB" altLang="en-US" sz="2000" dirty="0" smtClean="0">
+              <a:rPr lang="en-GB" altLang="en-US" sz="2000" dirty="0">
                 <a:latin typeface="Courier New" panose="02070309020205020404" pitchFamily="49" charset="0"/>
                 <a:cs typeface="Courier New" panose="02070309020205020404" pitchFamily="49" charset="0"/>
               </a:rPr>
-              <a:t>("Could not convert to </a:t>
-            </a:r>
-            <a:r>
-              <a:rPr lang="en-GB" altLang="en-US" sz="2000" dirty="0" err="1" smtClean="0">
+              <a:t>(</a:t>
+            </a:r>
+            <a:r>
+              <a:rPr lang="en-GB" altLang="en-US" sz="2000" dirty="0" err="1">
                 <a:latin typeface="Courier New" panose="02070309020205020404" pitchFamily="49" charset="0"/>
                 <a:cs typeface="Courier New" panose="02070309020205020404" pitchFamily="49" charset="0"/>
               </a:rPr>
-              <a:t>int</a:t>
-            </a:r>
-            <a:r>
-              <a:rPr lang="en-GB" altLang="en-US" sz="2000" dirty="0" smtClean="0">
+              <a:t>f"Really</a:t>
+            </a:r>
+            <a:r>
+              <a:rPr lang="en-GB" altLang="en-US" sz="2000" dirty="0">
                 <a:latin typeface="Courier New" panose="02070309020205020404" pitchFamily="49" charset="0"/>
                 <a:cs typeface="Courier New" panose="02070309020205020404" pitchFamily="49" charset="0"/>
               </a:rPr>
-              <a:t>: {0} ".format(f))</a:t>
+              <a:t> unexpected error: {err}")</a:t>
             </a:r>
           </a:p>
           <a:p>
@@ -6222,41 +6302,10 @@
               <a:buFont typeface="Arial" panose="020B0604020202020204" pitchFamily="34" charset="0"/>
               <a:buNone/>
             </a:pPr>
-            <a:r>
-              <a:rPr lang="en-GB" altLang="en-US" sz="2000" b="1" dirty="0" smtClean="0">
-                <a:latin typeface="Courier New" panose="02070309020205020404" pitchFamily="49" charset="0"/>
-                <a:cs typeface="Courier New" panose="02070309020205020404" pitchFamily="49" charset="0"/>
-              </a:rPr>
-              <a:t>    except </a:t>
-            </a:r>
-            <a:r>
-              <a:rPr lang="en-GB" altLang="en-US" sz="2000" dirty="0" smtClean="0">
-                <a:latin typeface="Courier New" panose="02070309020205020404" pitchFamily="49" charset="0"/>
-                <a:cs typeface="Courier New" panose="02070309020205020404" pitchFamily="49" charset="0"/>
-              </a:rPr>
-              <a:t>Exception </a:t>
-            </a:r>
-            <a:r>
-              <a:rPr lang="en-GB" altLang="en-US" sz="2000" b="1" dirty="0" smtClean="0">
-                <a:latin typeface="Courier New" panose="02070309020205020404" pitchFamily="49" charset="0"/>
-                <a:cs typeface="Courier New" panose="02070309020205020404" pitchFamily="49" charset="0"/>
-              </a:rPr>
-              <a:t>as</a:t>
-            </a:r>
-            <a:r>
-              <a:rPr lang="en-GB" altLang="en-US" sz="2000" dirty="0" smtClean="0">
-                <a:latin typeface="Courier New" panose="02070309020205020404" pitchFamily="49" charset="0"/>
-                <a:cs typeface="Courier New" panose="02070309020205020404" pitchFamily="49" charset="0"/>
-              </a:rPr>
-              <a:t> err</a:t>
-            </a:r>
-            <a:r>
-              <a:rPr lang="en-GB" altLang="en-US" sz="2000" b="1" dirty="0" smtClean="0">
-                <a:latin typeface="Courier New" panose="02070309020205020404" pitchFamily="49" charset="0"/>
-                <a:cs typeface="Courier New" panose="02070309020205020404" pitchFamily="49" charset="0"/>
-              </a:rPr>
-              <a:t>:</a:t>
-            </a:r>
+            <a:endParaRPr lang="en-GB" altLang="en-US" sz="2000" dirty="0">
+              <a:latin typeface="Courier New" panose="02070309020205020404" pitchFamily="49" charset="0"/>
+              <a:cs typeface="Courier New" panose="02070309020205020404" pitchFamily="49" charset="0"/>
+            </a:endParaRPr>
           </a:p>
           <a:p>
             <a:pPr marL="0" indent="0">
@@ -6264,44 +6313,7 @@
               <a:buNone/>
             </a:pPr>
             <a:r>
-              <a:rPr lang="en-GB" altLang="en-US" sz="2000" dirty="0" smtClean="0">
-                <a:latin typeface="Courier New" panose="02070309020205020404" pitchFamily="49" charset="0"/>
-                <a:cs typeface="Courier New" panose="02070309020205020404" pitchFamily="49" charset="0"/>
-              </a:rPr>
-              <a:t>        </a:t>
-            </a:r>
-            <a:r>
-              <a:rPr lang="en-GB" altLang="en-US" sz="2000" b="1" dirty="0" smtClean="0">
-                <a:latin typeface="Courier New" panose="02070309020205020404" pitchFamily="49" charset="0"/>
-                <a:cs typeface="Courier New" panose="02070309020205020404" pitchFamily="49" charset="0"/>
-              </a:rPr>
-              <a:t>print</a:t>
-            </a:r>
-            <a:r>
-              <a:rPr lang="en-GB" altLang="en-US" sz="2000" dirty="0" smtClean="0">
-                <a:latin typeface="Courier New" panose="02070309020205020404" pitchFamily="49" charset="0"/>
-                <a:cs typeface="Courier New" panose="02070309020205020404" pitchFamily="49" charset="0"/>
-              </a:rPr>
-              <a:t>("Really unexpected error: {0}".format(err))</a:t>
-            </a:r>
-          </a:p>
-          <a:p>
-            <a:pPr marL="0" indent="0">
-              <a:buFont typeface="Arial" panose="020B0604020202020204" pitchFamily="34" charset="0"/>
-              <a:buNone/>
-            </a:pPr>
-            <a:endParaRPr lang="en-GB" altLang="en-US" sz="2000" dirty="0" smtClean="0">
-              <a:latin typeface="Courier New" panose="02070309020205020404" pitchFamily="49" charset="0"/>
-              <a:cs typeface="Courier New" panose="02070309020205020404" pitchFamily="49" charset="0"/>
-            </a:endParaRPr>
-          </a:p>
-          <a:p>
-            <a:pPr marL="0" indent="0">
-              <a:buFont typeface="Arial" panose="020B0604020202020204" pitchFamily="34" charset="0"/>
-              <a:buNone/>
-            </a:pPr>
-            <a:r>
-              <a:rPr lang="en-GB" altLang="en-US" sz="2000" dirty="0" smtClean="0">
+              <a:rPr lang="en-GB" altLang="en-US" sz="2000" dirty="0">
                 <a:solidFill>
                   <a:srgbClr val="FFC000"/>
                 </a:solidFill>
@@ -6655,7 +6667,7 @@
           <a:lstStyle/>
           <a:p>
             <a:r>
-              <a:rPr lang="en-GB" altLang="en-US" b="1" smtClean="0"/>
+              <a:rPr lang="en-GB" altLang="en-US" b="1"/>
               <a:t>Further Reading</a:t>
             </a:r>
           </a:p>
@@ -6681,7 +6693,7 @@
               <a:buNone/>
             </a:pPr>
             <a:r>
-              <a:rPr lang="en-GB" altLang="en-US" smtClean="0"/>
+              <a:rPr lang="en-GB" altLang="en-US"/>
               <a:t>Much of this presentation was taken from the python documentation pages:</a:t>
             </a:r>
           </a:p>
@@ -6690,7 +6702,7 @@
               <a:buFont typeface="Arial" panose="020B0604020202020204" pitchFamily="34" charset="0"/>
               <a:buNone/>
             </a:pPr>
-            <a:endParaRPr lang="en-GB" altLang="en-US" smtClean="0"/>
+            <a:endParaRPr lang="en-GB" altLang="en-US"/>
           </a:p>
           <a:p>
             <a:pPr marL="0" indent="0">
@@ -6698,19 +6710,19 @@
               <a:buNone/>
             </a:pPr>
             <a:r>
-              <a:rPr lang="en-GB" altLang="en-US" smtClean="0">
+              <a:rPr lang="en-GB" altLang="en-US">
                 <a:hlinkClick r:id="rId2"/>
               </a:rPr>
               <a:t>https://docs.python.org/3/tutorial/errors.html</a:t>
             </a:r>
-            <a:endParaRPr lang="en-GB" altLang="en-US" smtClean="0"/>
+            <a:endParaRPr lang="en-GB" altLang="en-US"/>
           </a:p>
           <a:p>
             <a:pPr marL="0" indent="0">
               <a:buFont typeface="Arial" panose="020B0604020202020204" pitchFamily="34" charset="0"/>
               <a:buNone/>
             </a:pPr>
-            <a:endParaRPr lang="en-GB" altLang="en-US" smtClean="0"/>
+            <a:endParaRPr lang="en-GB" altLang="en-US"/>
           </a:p>
         </p:txBody>
       </p:sp>
@@ -6719,13 +6731,6 @@
   <p:clrMapOvr>
     <a:masterClrMapping/>
   </p:clrMapOvr>
-  <p:timing>
-    <p:tnLst>
-      <p:par>
-        <p:cTn id="1" dur="indefinite" restart="never" nodeType="tmRoot"/>
-      </p:par>
-    </p:tnLst>
-  </p:timing>
 </p:sld>
 </file>
 
@@ -6767,7 +6772,7 @@
           <a:lstStyle/>
           <a:p>
             <a:r>
-              <a:rPr lang="en-GB" altLang="en-US" b="1" smtClean="0"/>
+              <a:rPr lang="en-GB" altLang="en-US" b="1"/>
               <a:t>Errors</a:t>
             </a:r>
           </a:p>
@@ -6793,7 +6798,7 @@
               <a:buNone/>
             </a:pPr>
             <a:r>
-              <a:rPr lang="en-GB" altLang="en-US" smtClean="0"/>
+              <a:rPr lang="en-GB" altLang="en-US"/>
               <a:t>Computer programmes break. It's a fact of life.</a:t>
             </a:r>
           </a:p>
@@ -6802,7 +6807,7 @@
               <a:buFont typeface="Arial" panose="020B0604020202020204" pitchFamily="34" charset="0"/>
               <a:buNone/>
             </a:pPr>
-            <a:endParaRPr lang="en-GB" altLang="en-US" smtClean="0"/>
+            <a:endParaRPr lang="en-GB" altLang="en-US"/>
           </a:p>
           <a:p>
             <a:pPr>
@@ -6810,7 +6815,7 @@
               <a:buNone/>
             </a:pPr>
             <a:r>
-              <a:rPr lang="en-GB" altLang="en-US" smtClean="0"/>
+              <a:rPr lang="en-GB" altLang="en-US"/>
               <a:t>There are (at least) two distinguishable kinds of errors: </a:t>
             </a:r>
           </a:p>
@@ -6820,27 +6825,27 @@
               <a:buNone/>
             </a:pPr>
             <a:r>
-              <a:rPr lang="en-GB" altLang="en-US" i="1" smtClean="0"/>
+              <a:rPr lang="en-GB" altLang="en-US" i="1"/>
               <a:t>		</a:t>
             </a:r>
             <a:r>
-              <a:rPr lang="en-GB" altLang="en-US" b="1" i="1" smtClean="0"/>
+              <a:rPr lang="en-GB" altLang="en-US" b="1" i="1"/>
               <a:t>syntax errors</a:t>
             </a:r>
             <a:r>
-              <a:rPr lang="en-GB" altLang="en-US" b="1" smtClean="0"/>
+              <a:rPr lang="en-GB" altLang="en-US" b="1"/>
               <a:t> </a:t>
             </a:r>
             <a:r>
-              <a:rPr lang="en-GB" altLang="en-US" smtClean="0"/>
+              <a:rPr lang="en-GB" altLang="en-US"/>
               <a:t>and </a:t>
             </a:r>
             <a:r>
-              <a:rPr lang="en-GB" altLang="en-US" b="1" i="1" smtClean="0"/>
+              <a:rPr lang="en-GB" altLang="en-US" b="1" i="1"/>
               <a:t>exceptions</a:t>
             </a:r>
             <a:r>
-              <a:rPr lang="en-GB" altLang="en-US" smtClean="0"/>
+              <a:rPr lang="en-GB" altLang="en-US"/>
               <a:t>.</a:t>
             </a:r>
           </a:p>
@@ -7056,7 +7061,7 @@
           <a:lstStyle/>
           <a:p>
             <a:r>
-              <a:rPr lang="en-GB" altLang="en-US" b="1" smtClean="0"/>
+              <a:rPr lang="en-GB" altLang="en-US" b="1"/>
               <a:t>Syntax Errors</a:t>
             </a:r>
           </a:p>
@@ -7088,15 +7093,15 @@
               <a:defRPr/>
             </a:pPr>
             <a:r>
-              <a:rPr lang="en-GB" dirty="0" smtClean="0"/>
+              <a:rPr lang="en-GB" dirty="0"/>
               <a:t>Syntax errors, or </a:t>
             </a:r>
             <a:r>
-              <a:rPr lang="en-GB" i="1" dirty="0" smtClean="0"/>
+              <a:rPr lang="en-GB" i="1" dirty="0"/>
               <a:t>parsing errors</a:t>
             </a:r>
             <a:r>
-              <a:rPr lang="en-GB" dirty="0" smtClean="0"/>
+              <a:rPr lang="en-GB" dirty="0"/>
               <a:t>, are very common when learning:</a:t>
             </a:r>
           </a:p>
@@ -7109,7 +7114,7 @@
               <a:buNone/>
               <a:defRPr/>
             </a:pPr>
-            <a:endParaRPr lang="en-GB" dirty="0" smtClean="0"/>
+            <a:endParaRPr lang="en-GB" dirty="0"/>
           </a:p>
         </p:txBody>
       </p:sp>
@@ -7214,13 +7219,6 @@
   <p:clrMapOvr>
     <a:masterClrMapping/>
   </p:clrMapOvr>
-  <p:timing>
-    <p:tnLst>
-      <p:par>
-        <p:cTn id="1" dur="indefinite" restart="never" nodeType="tmRoot"/>
-      </p:par>
-    </p:tnLst>
-  </p:timing>
 </p:sld>
 </file>
 
@@ -7257,7 +7255,7 @@
           <a:lstStyle/>
           <a:p>
             <a:r>
-              <a:rPr lang="en-GB" altLang="en-US" b="1" smtClean="0"/>
+              <a:rPr lang="en-GB" altLang="en-US" b="1"/>
               <a:t>Exceptions</a:t>
             </a:r>
           </a:p>
@@ -7284,43 +7282,43 @@
           <a:lstStyle/>
           <a:p>
             <a:r>
-              <a:rPr lang="en-GB" altLang="en-US" smtClean="0"/>
+              <a:rPr lang="en-GB" altLang="en-US"/>
               <a:t>Even if a statement or expression is syntactically correct, it may cause an error on execution.</a:t>
             </a:r>
           </a:p>
           <a:p>
             <a:r>
-              <a:rPr lang="en-GB" altLang="en-US" smtClean="0"/>
+              <a:rPr lang="en-GB" altLang="en-US"/>
               <a:t>Errors detected during execution are called </a:t>
             </a:r>
             <a:r>
-              <a:rPr lang="en-GB" altLang="en-US" i="1" smtClean="0"/>
+              <a:rPr lang="en-GB" altLang="en-US" i="1"/>
               <a:t>exceptions</a:t>
             </a:r>
             <a:r>
-              <a:rPr lang="en-GB" altLang="en-US" smtClean="0"/>
+              <a:rPr lang="en-GB" altLang="en-US"/>
               <a:t> and are not unconditionally fatal.</a:t>
             </a:r>
           </a:p>
           <a:p>
             <a:r>
-              <a:rPr lang="en-GB" altLang="en-US" smtClean="0"/>
+              <a:rPr lang="en-GB" altLang="en-US"/>
               <a:t>You can </a:t>
             </a:r>
             <a:r>
-              <a:rPr lang="en-GB" altLang="en-US" i="1" smtClean="0"/>
+              <a:rPr lang="en-GB" altLang="en-US" i="1"/>
               <a:t>catch</a:t>
             </a:r>
             <a:r>
-              <a:rPr lang="en-GB" altLang="en-US" smtClean="0"/>
+              <a:rPr lang="en-GB" altLang="en-US"/>
               <a:t> an exception and decide how to </a:t>
             </a:r>
             <a:r>
-              <a:rPr lang="en-GB" altLang="en-US" i="1" smtClean="0"/>
+              <a:rPr lang="en-GB" altLang="en-US" i="1"/>
               <a:t>handle</a:t>
             </a:r>
             <a:r>
-              <a:rPr lang="en-GB" altLang="en-US" smtClean="0"/>
+              <a:rPr lang="en-GB" altLang="en-US"/>
               <a:t> it.</a:t>
             </a:r>
           </a:p>
@@ -7549,7 +7547,7 @@
           <a:lstStyle/>
           <a:p>
             <a:r>
-              <a:rPr lang="en-GB" altLang="en-US" b="1" smtClean="0"/>
+              <a:rPr lang="en-GB" altLang="en-US" b="1"/>
               <a:t>Types of exception</a:t>
             </a:r>
           </a:p>
@@ -7586,7 +7584,7 @@
               <a:defRPr/>
             </a:pPr>
             <a:r>
-              <a:rPr lang="en-GB" dirty="0" smtClean="0"/>
+              <a:rPr lang="en-GB" dirty="0"/>
               <a:t>Exceptions come in different types, and the type is printed as part of the message, e.g.:</a:t>
             </a:r>
           </a:p>
@@ -7600,7 +7598,7 @@
               <a:defRPr/>
             </a:pPr>
             <a:r>
-              <a:rPr lang="en-GB" dirty="0" err="1" smtClean="0">
+              <a:rPr lang="en-GB" dirty="0" err="1">
                 <a:hlinkClick r:id="rId3" tooltip="exceptions.ZeroDivisionError"/>
               </a:rPr>
               <a:t>ZeroDivisionError</a:t>
@@ -7617,13 +7615,13 @@
               <a:defRPr/>
             </a:pPr>
             <a:r>
-              <a:rPr lang="en-GB" u="sng" dirty="0" err="1" smtClean="0">
+              <a:rPr lang="en-GB" u="sng" dirty="0" err="1">
                 <a:hlinkClick r:id="rId4" tooltip="exceptions.NameError"/>
               </a:rPr>
               <a:t>NameError</a:t>
             </a:r>
             <a:r>
-              <a:rPr lang="en-GB" u="sng" dirty="0" smtClean="0"/>
+              <a:rPr lang="en-GB" u="sng" dirty="0"/>
               <a:t> </a:t>
             </a:r>
           </a:p>
@@ -7637,12 +7635,12 @@
               <a:defRPr/>
             </a:pPr>
             <a:r>
-              <a:rPr lang="en-GB" dirty="0" err="1" smtClean="0">
+              <a:rPr lang="en-GB" dirty="0" err="1">
                 <a:hlinkClick r:id="rId5" tooltip="exceptions.TypeError"/>
               </a:rPr>
               <a:t>TypeError</a:t>
             </a:r>
-            <a:endParaRPr lang="en-GB" dirty="0" smtClean="0"/>
+            <a:endParaRPr lang="en-GB" dirty="0"/>
           </a:p>
           <a:p>
             <a:pPr fontAlgn="auto">
@@ -7654,15 +7652,15 @@
               <a:defRPr/>
             </a:pPr>
             <a:r>
-              <a:rPr lang="en-GB" dirty="0" smtClean="0"/>
+              <a:rPr lang="en-GB" dirty="0"/>
               <a:t>And </a:t>
             </a:r>
             <a:r>
-              <a:rPr lang="en-GB" b="1" dirty="0" smtClean="0"/>
+              <a:rPr lang="en-GB" b="1" dirty="0"/>
               <a:t>you can define your own exceptions</a:t>
             </a:r>
             <a:r>
-              <a:rPr lang="en-GB" dirty="0" smtClean="0"/>
+              <a:rPr lang="en-GB" dirty="0"/>
               <a:t>, e.g.:</a:t>
             </a:r>
           </a:p>
@@ -7676,12 +7674,12 @@
               <a:defRPr/>
             </a:pPr>
             <a:r>
-              <a:rPr lang="en-GB" sz="2800" dirty="0" err="1" smtClean="0">
+              <a:rPr lang="en-GB" sz="2800" dirty="0" err="1">
                 <a:hlinkClick r:id="rId3" tooltip="exceptions.ZeroDivisionError"/>
               </a:rPr>
               <a:t>MyAppBadUserInputError</a:t>
             </a:r>
-            <a:endParaRPr lang="en-GB" sz="2800" dirty="0" smtClean="0"/>
+            <a:endParaRPr lang="en-GB" sz="2800" dirty="0"/>
           </a:p>
           <a:p>
             <a:pPr fontAlgn="auto">
@@ -7692,7 +7690,7 @@
               <a:buChar char="•"/>
               <a:defRPr/>
             </a:pPr>
-            <a:endParaRPr lang="en-GB" dirty="0" smtClean="0"/>
+            <a:endParaRPr lang="en-GB" dirty="0"/>
           </a:p>
           <a:p>
             <a:pPr marL="457200" lvl="1" indent="0" fontAlgn="auto">
@@ -7703,7 +7701,7 @@
               <a:buNone/>
               <a:defRPr/>
             </a:pPr>
-            <a:endParaRPr lang="en-GB" dirty="0" smtClean="0"/>
+            <a:endParaRPr lang="en-GB" dirty="0"/>
           </a:p>
           <a:p>
             <a:pPr marL="457200" lvl="1" indent="0" fontAlgn="auto">
@@ -7714,7 +7712,7 @@
               <a:buNone/>
               <a:defRPr/>
             </a:pPr>
-            <a:endParaRPr lang="en-GB" dirty="0" smtClean="0"/>
+            <a:endParaRPr lang="en-GB" dirty="0"/>
           </a:p>
         </p:txBody>
       </p:sp>
@@ -7869,7 +7867,7 @@
           <a:lstStyle/>
           <a:p>
             <a:r>
-              <a:rPr lang="en-GB" altLang="en-US" b="1" smtClean="0"/>
+              <a:rPr lang="en-GB" altLang="en-US" b="1"/>
               <a:t>Catching exceptions</a:t>
             </a:r>
           </a:p>
@@ -7906,24 +7904,24 @@
               <a:defRPr/>
             </a:pPr>
             <a:r>
-              <a:rPr lang="en-GB" dirty="0" smtClean="0"/>
+              <a:rPr lang="en-GB" dirty="0"/>
               <a:t>You can catch errors and decide how to handle them using:  </a:t>
             </a:r>
             <a:r>
-              <a:rPr lang="en-GB" dirty="0" smtClean="0">
+              <a:rPr lang="en-GB" dirty="0">
                 <a:latin typeface="Courier New" panose="02070309020205020404" pitchFamily="49" charset="0"/>
                 <a:cs typeface="Courier New" panose="02070309020205020404" pitchFamily="49" charset="0"/>
               </a:rPr>
               <a:t>try </a:t>
             </a:r>
             <a:r>
-              <a:rPr lang="en-GB" dirty="0" smtClean="0">
+              <a:rPr lang="en-GB" dirty="0">
                 <a:cs typeface="Courier New" panose="02070309020205020404" pitchFamily="49" charset="0"/>
               </a:rPr>
               <a:t>and</a:t>
             </a:r>
             <a:r>
-              <a:rPr lang="en-GB" dirty="0" smtClean="0">
+              <a:rPr lang="en-GB" dirty="0">
                 <a:latin typeface="Courier New" panose="02070309020205020404" pitchFamily="49" charset="0"/>
                 <a:cs typeface="Courier New" panose="02070309020205020404" pitchFamily="49" charset="0"/>
               </a:rPr>
@@ -7939,7 +7937,7 @@
               <a:buNone/>
               <a:defRPr/>
             </a:pPr>
-            <a:endParaRPr lang="en-GB" sz="1000" dirty="0" smtClean="0"/>
+            <a:endParaRPr lang="en-GB" sz="1000" dirty="0"/>
           </a:p>
           <a:p>
             <a:pPr marL="0" indent="0" fontAlgn="auto">
@@ -7955,14 +7953,7 @@
                 <a:latin typeface="Courier New" panose="02070309020205020404" pitchFamily="49" charset="0"/>
                 <a:cs typeface="Courier New" panose="02070309020205020404" pitchFamily="49" charset="0"/>
               </a:rPr>
-              <a:t>t</a:t>
-            </a:r>
-            <a:r>
-              <a:rPr lang="en-GB" sz="2000" b="1" dirty="0" smtClean="0">
-                <a:latin typeface="Courier New" panose="02070309020205020404" pitchFamily="49" charset="0"/>
-                <a:cs typeface="Courier New" panose="02070309020205020404" pitchFamily="49" charset="0"/>
-              </a:rPr>
-              <a:t>ry:</a:t>
+              <a:t>try:</a:t>
             </a:r>
           </a:p>
           <a:p>
@@ -7975,32 +7966,25 @@
               <a:defRPr/>
             </a:pPr>
             <a:r>
-              <a:rPr lang="en-GB" sz="2000" dirty="0" smtClean="0">
+              <a:rPr lang="en-GB" sz="2000" dirty="0">
                 <a:latin typeface="Courier New" panose="02070309020205020404" pitchFamily="49" charset="0"/>
                 <a:cs typeface="Courier New" panose="02070309020205020404" pitchFamily="49" charset="0"/>
               </a:rPr>
               <a:t>    result = </a:t>
             </a:r>
             <a:r>
-              <a:rPr lang="en-GB" sz="2000" dirty="0" err="1" smtClean="0">
+              <a:rPr lang="en-GB" sz="2000" dirty="0" err="1">
                 <a:latin typeface="Courier New" panose="02070309020205020404" pitchFamily="49" charset="0"/>
                 <a:cs typeface="Courier New" panose="02070309020205020404" pitchFamily="49" charset="0"/>
               </a:rPr>
               <a:t>run_my_climate_model</a:t>
             </a:r>
             <a:r>
-              <a:rPr lang="en-GB" sz="2000" dirty="0" smtClean="0">
+              <a:rPr lang="en-GB" sz="2000" dirty="0">
                 <a:latin typeface="Courier New" panose="02070309020205020404" pitchFamily="49" charset="0"/>
                 <a:cs typeface="Courier New" panose="02070309020205020404" pitchFamily="49" charset="0"/>
               </a:rPr>
-              <a:t>(experiment</a:t>
-            </a:r>
-            <a:r>
-              <a:rPr lang="en-GB" sz="2000" dirty="0" smtClean="0">
-                <a:latin typeface="Courier New" panose="02070309020205020404" pitchFamily="49" charset="0"/>
-                <a:cs typeface="Courier New" panose="02070309020205020404" pitchFamily="49" charset="0"/>
-              </a:rPr>
-              <a:t>)</a:t>
+              <a:t>(experiment)</a:t>
             </a:r>
           </a:p>
           <a:p>
@@ -8017,14 +8001,7 @@
                 <a:latin typeface="Courier New" panose="02070309020205020404" pitchFamily="49" charset="0"/>
                 <a:cs typeface="Courier New" panose="02070309020205020404" pitchFamily="49" charset="0"/>
               </a:rPr>
-              <a:t>e</a:t>
-            </a:r>
-            <a:r>
-              <a:rPr lang="en-GB" sz="2000" b="1" dirty="0" smtClean="0">
-                <a:latin typeface="Courier New" panose="02070309020205020404" pitchFamily="49" charset="0"/>
-                <a:cs typeface="Courier New" panose="02070309020205020404" pitchFamily="49" charset="0"/>
-              </a:rPr>
-              <a:t>xcept:</a:t>
+              <a:t>except:</a:t>
             </a:r>
           </a:p>
           <a:p>
@@ -8037,14 +8014,14 @@
               <a:defRPr/>
             </a:pPr>
             <a:r>
-              <a:rPr lang="en-GB" sz="2000" dirty="0" smtClean="0">
+              <a:rPr lang="en-GB" sz="2000" dirty="0">
                 <a:latin typeface="Courier New" panose="02070309020205020404" pitchFamily="49" charset="0"/>
                 <a:cs typeface="Courier New" panose="02070309020205020404" pitchFamily="49" charset="0"/>
               </a:rPr>
               <a:t>    </a:t>
             </a:r>
             <a:r>
-              <a:rPr lang="en-GB" sz="2000" dirty="0" smtClean="0">
+              <a:rPr lang="en-GB" sz="2000" dirty="0">
                 <a:solidFill>
                   <a:srgbClr val="FFC000"/>
                 </a:solidFill>
@@ -8064,21 +8041,21 @@
               <a:defRPr/>
             </a:pPr>
             <a:r>
-              <a:rPr lang="en-GB" sz="2000" dirty="0" smtClean="0">
+              <a:rPr lang="en-GB" sz="2000" dirty="0">
                 <a:latin typeface="Courier New" panose="02070309020205020404" pitchFamily="49" charset="0"/>
                 <a:cs typeface="Courier New" panose="02070309020205020404" pitchFamily="49" charset="0"/>
               </a:rPr>
               <a:t>    </a:t>
             </a:r>
             <a:r>
-              <a:rPr lang="en-GB" sz="2000" dirty="0" err="1" smtClean="0">
+              <a:rPr lang="en-GB" sz="2000" dirty="0" err="1">
                 <a:latin typeface="Courier New" panose="02070309020205020404" pitchFamily="49" charset="0"/>
                 <a:cs typeface="Courier New" panose="02070309020205020404" pitchFamily="49" charset="0"/>
               </a:rPr>
               <a:t>email_me</a:t>
             </a:r>
             <a:r>
-              <a:rPr lang="en-GB" sz="2000" dirty="0" smtClean="0">
+              <a:rPr lang="en-GB" sz="2000" dirty="0">
                 <a:latin typeface="Courier New" panose="02070309020205020404" pitchFamily="49" charset="0"/>
                 <a:cs typeface="Courier New" panose="02070309020205020404" pitchFamily="49" charset="0"/>
               </a:rPr>
@@ -8095,21 +8072,21 @@
               <a:defRPr/>
             </a:pPr>
             <a:r>
-              <a:rPr lang="en-GB" sz="2000" dirty="0" smtClean="0">
+              <a:rPr lang="en-GB" sz="2000" dirty="0">
                 <a:latin typeface="Courier New" panose="02070309020205020404" pitchFamily="49" charset="0"/>
                 <a:cs typeface="Courier New" panose="02070309020205020404" pitchFamily="49" charset="0"/>
               </a:rPr>
               <a:t>    </a:t>
             </a:r>
             <a:r>
-              <a:rPr lang="en-GB" sz="2000" b="1" dirty="0" smtClean="0">
+              <a:rPr lang="en-GB" sz="2000" b="1" dirty="0">
                 <a:latin typeface="Courier New" panose="02070309020205020404" pitchFamily="49" charset="0"/>
                 <a:cs typeface="Courier New" panose="02070309020205020404" pitchFamily="49" charset="0"/>
               </a:rPr>
               <a:t>print</a:t>
             </a:r>
             <a:r>
-              <a:rPr lang="en-GB" sz="2000" dirty="0" smtClean="0">
+              <a:rPr lang="en-GB" sz="2000" dirty="0">
                 <a:latin typeface="Courier New" panose="02070309020205020404" pitchFamily="49" charset="0"/>
                 <a:cs typeface="Courier New" panose="02070309020205020404" pitchFamily="49" charset="0"/>
               </a:rPr>
@@ -8140,14 +8117,14 @@
               <a:defRPr/>
             </a:pPr>
             <a:r>
-              <a:rPr lang="en-GB" dirty="0" smtClean="0">
+              <a:rPr lang="en-GB" dirty="0">
                 <a:solidFill>
                   <a:prstClr val="black"/>
                 </a:solidFill>
               </a:rPr>
               <a:t>By handling errors appropriately you can change the flow of your programme accordingly.</a:t>
             </a:r>
-            <a:endParaRPr lang="en-GB" sz="2400" dirty="0" smtClean="0">
+            <a:endParaRPr lang="en-GB" sz="2400" dirty="0">
               <a:latin typeface="Courier New" panose="02070309020205020404" pitchFamily="49" charset="0"/>
               <a:cs typeface="Courier New" panose="02070309020205020404" pitchFamily="49" charset="0"/>
             </a:endParaRPr>
@@ -8483,7 +8460,7 @@
           <a:lstStyle/>
           <a:p>
             <a:r>
-              <a:rPr lang="en-GB" altLang="en-US" b="1" smtClean="0"/>
+              <a:rPr lang="en-GB" altLang="en-US" b="1"/>
               <a:t>Raising exceptions</a:t>
             </a:r>
           </a:p>
@@ -8520,14 +8497,14 @@
               <a:defRPr/>
             </a:pPr>
             <a:r>
-              <a:rPr lang="en-GB" dirty="0" smtClean="0"/>
+              <a:rPr lang="en-GB" dirty="0"/>
               <a:t>You can even trigger your own exceptions using: </a:t>
             </a:r>
             <a:r>
-              <a:rPr lang="en-GB" b="1" dirty="0" smtClean="0"/>
+              <a:rPr lang="en-GB" b="1" dirty="0"/>
               <a:t>raise</a:t>
             </a:r>
-            <a:endParaRPr lang="en-GB" dirty="0" smtClean="0"/>
+            <a:endParaRPr lang="en-GB" dirty="0"/>
           </a:p>
           <a:p>
             <a:pPr marL="0" indent="0" fontAlgn="auto">
@@ -8538,7 +8515,7 @@
               <a:buNone/>
               <a:defRPr/>
             </a:pPr>
-            <a:endParaRPr lang="en-GB" dirty="0" smtClean="0"/>
+            <a:endParaRPr lang="en-GB" dirty="0"/>
           </a:p>
           <a:p>
             <a:pPr marL="0" indent="0" fontAlgn="auto">
@@ -8554,17 +8531,10 @@
                 <a:latin typeface="Courier New" panose="02070309020205020404" pitchFamily="49" charset="0"/>
                 <a:cs typeface="Courier New" panose="02070309020205020404" pitchFamily="49" charset="0"/>
               </a:rPr>
-              <a:t>i</a:t>
-            </a:r>
-            <a:r>
-              <a:rPr lang="en-GB" sz="2000" b="1" dirty="0" smtClean="0">
-                <a:latin typeface="Courier New" panose="02070309020205020404" pitchFamily="49" charset="0"/>
-                <a:cs typeface="Courier New" panose="02070309020205020404" pitchFamily="49" charset="0"/>
-              </a:rPr>
-              <a:t>f</a:t>
-            </a:r>
-            <a:r>
-              <a:rPr lang="en-GB" sz="2000" dirty="0" smtClean="0">
+              <a:t>if</a:t>
+            </a:r>
+            <a:r>
+              <a:rPr lang="en-GB" sz="2000" dirty="0">
                 <a:latin typeface="Courier New" panose="02070309020205020404" pitchFamily="49" charset="0"/>
                 <a:cs typeface="Courier New" panose="02070309020205020404" pitchFamily="49" charset="0"/>
               </a:rPr>
@@ -8581,21 +8551,21 @@
               <a:defRPr/>
             </a:pPr>
             <a:r>
-              <a:rPr lang="en-GB" sz="2000" dirty="0" smtClean="0">
+              <a:rPr lang="en-GB" sz="2000" dirty="0">
                 <a:latin typeface="Courier New" panose="02070309020205020404" pitchFamily="49" charset="0"/>
                 <a:cs typeface="Courier New" panose="02070309020205020404" pitchFamily="49" charset="0"/>
               </a:rPr>
               <a:t>    </a:t>
             </a:r>
             <a:r>
-              <a:rPr lang="en-GB" sz="2000" b="1" dirty="0" smtClean="0">
+              <a:rPr lang="en-GB" sz="2000" b="1" dirty="0">
                 <a:latin typeface="Courier New" panose="02070309020205020404" pitchFamily="49" charset="0"/>
                 <a:cs typeface="Courier New" panose="02070309020205020404" pitchFamily="49" charset="0"/>
               </a:rPr>
               <a:t>raise </a:t>
             </a:r>
             <a:r>
-              <a:rPr lang="en-GB" sz="2000" dirty="0" smtClean="0">
+              <a:rPr lang="en-GB" sz="2000" dirty="0">
                 <a:latin typeface="Courier New" panose="02070309020205020404" pitchFamily="49" charset="0"/>
                 <a:cs typeface="Courier New" panose="02070309020205020404" pitchFamily="49" charset="0"/>
               </a:rPr>
@@ -8612,14 +8582,14 @@
               <a:defRPr/>
             </a:pPr>
             <a:r>
-              <a:rPr lang="en-GB" sz="2000" b="1" dirty="0" smtClean="0">
+              <a:rPr lang="en-GB" sz="2000" b="1" dirty="0">
                 <a:latin typeface="Courier New" panose="02070309020205020404" pitchFamily="49" charset="0"/>
                 <a:cs typeface="Courier New" panose="02070309020205020404" pitchFamily="49" charset="0"/>
               </a:rPr>
               <a:t>    </a:t>
             </a:r>
             <a:r>
-              <a:rPr lang="en-GB" sz="2000" dirty="0" smtClean="0">
+              <a:rPr lang="en-GB" sz="2000" dirty="0">
                 <a:solidFill>
                   <a:srgbClr val="FFC000"/>
                 </a:solidFill>
@@ -8639,14 +8609,14 @@
               <a:defRPr/>
             </a:pPr>
             <a:r>
-              <a:rPr lang="en-GB" sz="2000" dirty="0" smtClean="0">
+              <a:rPr lang="en-GB" sz="2000" dirty="0">
                 <a:latin typeface="Courier New" panose="02070309020205020404" pitchFamily="49" charset="0"/>
                 <a:cs typeface="Courier New" panose="02070309020205020404" pitchFamily="49" charset="0"/>
               </a:rPr>
               <a:t>    </a:t>
             </a:r>
             <a:r>
-              <a:rPr lang="en-GB" sz="2000" dirty="0" smtClean="0">
+              <a:rPr lang="en-GB" sz="2000" dirty="0">
                 <a:solidFill>
                   <a:srgbClr val="FFC000"/>
                 </a:solidFill>
@@ -8670,17 +8640,10 @@
                 <a:latin typeface="Courier New" panose="02070309020205020404" pitchFamily="49" charset="0"/>
                 <a:cs typeface="Courier New" panose="02070309020205020404" pitchFamily="49" charset="0"/>
               </a:rPr>
-              <a:t>e</a:t>
-            </a:r>
-            <a:r>
-              <a:rPr lang="en-GB" sz="2000" b="1" dirty="0" smtClean="0">
-                <a:latin typeface="Courier New" panose="02070309020205020404" pitchFamily="49" charset="0"/>
-                <a:cs typeface="Courier New" panose="02070309020205020404" pitchFamily="49" charset="0"/>
-              </a:rPr>
-              <a:t>lse</a:t>
-            </a:r>
-            <a:r>
-              <a:rPr lang="en-GB" sz="2000" dirty="0" smtClean="0">
+              <a:t>else</a:t>
+            </a:r>
+            <a:r>
+              <a:rPr lang="en-GB" sz="2000" dirty="0">
                 <a:latin typeface="Courier New" panose="02070309020205020404" pitchFamily="49" charset="0"/>
                 <a:cs typeface="Courier New" panose="02070309020205020404" pitchFamily="49" charset="0"/>
               </a:rPr>
@@ -8697,21 +8660,21 @@
               <a:defRPr/>
             </a:pPr>
             <a:r>
-              <a:rPr lang="en-GB" sz="2000" dirty="0" smtClean="0">
+              <a:rPr lang="en-GB" sz="2000" dirty="0">
                 <a:latin typeface="Courier New" panose="02070309020205020404" pitchFamily="49" charset="0"/>
                 <a:cs typeface="Courier New" panose="02070309020205020404" pitchFamily="49" charset="0"/>
               </a:rPr>
               <a:t>    </a:t>
             </a:r>
             <a:r>
-              <a:rPr lang="en-GB" sz="2000" b="1" dirty="0" smtClean="0">
+              <a:rPr lang="en-GB" sz="2000" b="1" dirty="0">
                 <a:latin typeface="Courier New" panose="02070309020205020404" pitchFamily="49" charset="0"/>
                 <a:cs typeface="Courier New" panose="02070309020205020404" pitchFamily="49" charset="0"/>
               </a:rPr>
               <a:t>print</a:t>
             </a:r>
             <a:r>
-              <a:rPr lang="en-GB" sz="2000" dirty="0" smtClean="0">
+              <a:rPr lang="en-GB" sz="2000" dirty="0">
                 <a:latin typeface="Courier New" panose="02070309020205020404" pitchFamily="49" charset="0"/>
                 <a:cs typeface="Courier New" panose="02070309020205020404" pitchFamily="49" charset="0"/>
               </a:rPr>
@@ -8727,7 +8690,7 @@
               <a:buNone/>
               <a:defRPr/>
             </a:pPr>
-            <a:endParaRPr lang="en-GB" sz="2000" dirty="0" smtClean="0">
+            <a:endParaRPr lang="en-GB" sz="2000" dirty="0">
               <a:latin typeface="Courier New" panose="02070309020205020404" pitchFamily="49" charset="0"/>
               <a:cs typeface="Courier New" panose="02070309020205020404" pitchFamily="49" charset="0"/>
             </a:endParaRPr>
@@ -8742,7 +8705,7 @@
               <a:defRPr/>
             </a:pPr>
             <a:r>
-              <a:rPr lang="en-GB" sz="2000" dirty="0" smtClean="0">
+              <a:rPr lang="en-GB" sz="2000" dirty="0">
                 <a:cs typeface="Courier New" panose="02070309020205020404" pitchFamily="49" charset="0"/>
               </a:rPr>
               <a:t>...processing input here...</a:t>
@@ -8758,13 +8721,13 @@
               <a:defRPr/>
             </a:pPr>
             <a:r>
-              <a:rPr lang="en-GB" sz="2000" dirty="0" smtClean="0">
+              <a:rPr lang="en-GB" sz="2000" dirty="0">
                 <a:latin typeface="Courier New" panose="02070309020205020404" pitchFamily="49" charset="0"/>
                 <a:cs typeface="Courier New" panose="02070309020205020404" pitchFamily="49" charset="0"/>
               </a:rPr>
               <a:t>	</a:t>
             </a:r>
-            <a:endParaRPr lang="en-GB" sz="2000" dirty="0" smtClean="0"/>
+            <a:endParaRPr lang="en-GB" sz="2000" dirty="0"/>
           </a:p>
         </p:txBody>
       </p:sp>
@@ -9117,7 +9080,7 @@
           <a:lstStyle/>
           <a:p>
             <a:r>
-              <a:rPr lang="en-GB" altLang="en-US" b="1" smtClean="0"/>
+              <a:rPr lang="en-GB" altLang="en-US" b="1"/>
               <a:t>An example please</a:t>
             </a:r>
           </a:p>
@@ -9154,7 +9117,7 @@
               <a:defRPr/>
             </a:pPr>
             <a:r>
-              <a:rPr lang="en-GB" altLang="en-US" dirty="0" smtClean="0"/>
+              <a:rPr lang="en-GB" altLang="en-US" dirty="0"/>
               <a:t>In this example, I have written some code to read the content from a number of simple text files. Each file should contain a numeric code. </a:t>
             </a:r>
           </a:p>
@@ -9179,7 +9142,7 @@
               <a:defRPr/>
             </a:pPr>
             <a:r>
-              <a:rPr lang="en-GB" altLang="en-US" dirty="0" smtClean="0"/>
+              <a:rPr lang="en-GB" altLang="en-US" dirty="0"/>
               <a:t>There are two exceptions that I am interested in:</a:t>
             </a:r>
           </a:p>
@@ -9193,7 +9156,7 @@
               <a:defRPr/>
             </a:pPr>
             <a:r>
-              <a:rPr lang="en-GB" altLang="en-US" dirty="0" smtClean="0"/>
+              <a:rPr lang="en-GB" altLang="en-US" dirty="0"/>
               <a:t>File does not have content</a:t>
             </a:r>
           </a:p>
@@ -9207,7 +9170,7 @@
               <a:defRPr/>
             </a:pPr>
             <a:r>
-              <a:rPr lang="en-GB" altLang="en-US" dirty="0" smtClean="0"/>
+              <a:rPr lang="en-GB" altLang="en-US" dirty="0"/>
               <a:t>Contents of the file cannot be converted to an integer.</a:t>
             </a:r>
           </a:p>
@@ -9218,7 +9181,7 @@
               </a:spcAft>
               <a:defRPr/>
             </a:pPr>
-            <a:endParaRPr lang="en-GB" altLang="en-US" dirty="0" smtClean="0"/>
+            <a:endParaRPr lang="en-GB" altLang="en-US" dirty="0"/>
           </a:p>
         </p:txBody>
       </p:sp>
@@ -9404,7 +9367,7 @@
           <a:lstStyle/>
           <a:p>
             <a:r>
-              <a:rPr lang="en-GB" altLang="en-US" b="1" smtClean="0"/>
+              <a:rPr lang="en-GB" altLang="en-US" b="1"/>
               <a:t>An example continued</a:t>
             </a:r>
           </a:p>
@@ -9435,42 +9398,42 @@
               <a:buNone/>
             </a:pPr>
             <a:r>
-              <a:rPr lang="en-GB" altLang="en-US" sz="2400" b="1" dirty="0" smtClean="0">
+              <a:rPr lang="en-GB" altLang="en-US" sz="2400" b="1" dirty="0">
                 <a:latin typeface="Courier New" panose="02070309020205020404" pitchFamily="49" charset="0"/>
                 <a:cs typeface="Courier New" panose="02070309020205020404" pitchFamily="49" charset="0"/>
               </a:rPr>
               <a:t>def</a:t>
             </a:r>
             <a:r>
-              <a:rPr lang="en-GB" altLang="en-US" sz="2400" dirty="0" smtClean="0">
+              <a:rPr lang="en-GB" altLang="en-US" sz="2400" dirty="0">
                 <a:latin typeface="Courier New" panose="02070309020205020404" pitchFamily="49" charset="0"/>
                 <a:cs typeface="Courier New" panose="02070309020205020404" pitchFamily="49" charset="0"/>
               </a:rPr>
               <a:t> </a:t>
             </a:r>
             <a:r>
-              <a:rPr lang="en-GB" altLang="en-US" sz="2400" dirty="0" err="1" smtClean="0">
+              <a:rPr lang="en-GB" altLang="en-US" sz="2400" dirty="0" err="1">
                 <a:latin typeface="Courier New" panose="02070309020205020404" pitchFamily="49" charset="0"/>
                 <a:cs typeface="Courier New" panose="02070309020205020404" pitchFamily="49" charset="0"/>
               </a:rPr>
               <a:t>read_int_from_file</a:t>
             </a:r>
             <a:r>
-              <a:rPr lang="en-GB" altLang="en-US" sz="2400" dirty="0" smtClean="0">
+              <a:rPr lang="en-GB" altLang="en-US" sz="2400" dirty="0">
                 <a:latin typeface="Courier New" panose="02070309020205020404" pitchFamily="49" charset="0"/>
                 <a:cs typeface="Courier New" panose="02070309020205020404" pitchFamily="49" charset="0"/>
               </a:rPr>
               <a:t>(</a:t>
             </a:r>
             <a:r>
-              <a:rPr lang="en-GB" altLang="en-US" sz="2400" dirty="0" err="1" smtClean="0">
+              <a:rPr lang="en-GB" altLang="en-US" sz="2400" dirty="0" err="1">
                 <a:latin typeface="Courier New" panose="02070309020205020404" pitchFamily="49" charset="0"/>
                 <a:cs typeface="Courier New" panose="02070309020205020404" pitchFamily="49" charset="0"/>
               </a:rPr>
               <a:t>fname</a:t>
             </a:r>
             <a:r>
-              <a:rPr lang="en-GB" altLang="en-US" sz="2400" dirty="0" smtClean="0">
+              <a:rPr lang="en-GB" altLang="en-US" sz="2400" dirty="0">
                 <a:latin typeface="Courier New" panose="02070309020205020404" pitchFamily="49" charset="0"/>
                 <a:cs typeface="Courier New" panose="02070309020205020404" pitchFamily="49" charset="0"/>
               </a:rPr>
@@ -9483,7 +9446,7 @@
               <a:buNone/>
             </a:pPr>
             <a:r>
-              <a:rPr lang="en-GB" altLang="en-US" sz="2400" dirty="0" smtClean="0">
+              <a:rPr lang="en-GB" altLang="en-US" sz="2400" dirty="0">
                 <a:latin typeface="Courier New" panose="02070309020205020404" pitchFamily="49" charset="0"/>
                 <a:cs typeface="Courier New" panose="02070309020205020404" pitchFamily="49" charset="0"/>
               </a:rPr>
@@ -9496,49 +9459,49 @@
               <a:buNone/>
             </a:pPr>
             <a:r>
-              <a:rPr lang="en-GB" altLang="en-US" sz="2400" dirty="0" smtClean="0">
+              <a:rPr lang="en-GB" altLang="en-US" sz="2400" dirty="0">
                 <a:latin typeface="Courier New" panose="02070309020205020404" pitchFamily="49" charset="0"/>
                 <a:cs typeface="Courier New" panose="02070309020205020404" pitchFamily="49" charset="0"/>
               </a:rPr>
               <a:t>    </a:t>
             </a:r>
             <a:r>
-              <a:rPr lang="en-GB" altLang="en-US" sz="2400" b="1" dirty="0" smtClean="0">
+              <a:rPr lang="en-GB" altLang="en-US" sz="2400" b="1" dirty="0">
                 <a:latin typeface="Courier New" panose="02070309020205020404" pitchFamily="49" charset="0"/>
                 <a:cs typeface="Courier New" panose="02070309020205020404" pitchFamily="49" charset="0"/>
               </a:rPr>
               <a:t>with</a:t>
             </a:r>
             <a:r>
-              <a:rPr lang="en-GB" altLang="en-US" sz="2400" dirty="0" smtClean="0">
+              <a:rPr lang="en-GB" altLang="en-US" sz="2400" dirty="0">
                 <a:latin typeface="Courier New" panose="02070309020205020404" pitchFamily="49" charset="0"/>
                 <a:cs typeface="Courier New" panose="02070309020205020404" pitchFamily="49" charset="0"/>
               </a:rPr>
               <a:t> open(</a:t>
             </a:r>
             <a:r>
-              <a:rPr lang="en-GB" altLang="en-US" sz="2400" dirty="0" err="1" smtClean="0">
+              <a:rPr lang="en-GB" altLang="en-US" sz="2400" dirty="0" err="1">
                 <a:latin typeface="Courier New" panose="02070309020205020404" pitchFamily="49" charset="0"/>
                 <a:cs typeface="Courier New" panose="02070309020205020404" pitchFamily="49" charset="0"/>
               </a:rPr>
               <a:t>fname</a:t>
             </a:r>
             <a:r>
-              <a:rPr lang="en-GB" altLang="en-US" sz="2400" dirty="0" smtClean="0">
+              <a:rPr lang="en-GB" altLang="en-US" sz="2400" dirty="0">
                 <a:latin typeface="Courier New" panose="02070309020205020404" pitchFamily="49" charset="0"/>
                 <a:cs typeface="Courier New" panose="02070309020205020404" pitchFamily="49" charset="0"/>
               </a:rPr>
               <a:t>) </a:t>
             </a:r>
             <a:r>
-              <a:rPr lang="en-GB" altLang="en-US" sz="2400" b="1" dirty="0" smtClean="0">
+              <a:rPr lang="en-GB" altLang="en-US" sz="2400" b="1" dirty="0">
                 <a:latin typeface="Courier New" panose="02070309020205020404" pitchFamily="49" charset="0"/>
                 <a:cs typeface="Courier New" panose="02070309020205020404" pitchFamily="49" charset="0"/>
               </a:rPr>
               <a:t>as</a:t>
             </a:r>
             <a:r>
-              <a:rPr lang="en-GB" altLang="en-US" sz="2400" dirty="0" smtClean="0">
+              <a:rPr lang="en-GB" altLang="en-US" sz="2400" dirty="0">
                 <a:latin typeface="Courier New" panose="02070309020205020404" pitchFamily="49" charset="0"/>
                 <a:cs typeface="Courier New" panose="02070309020205020404" pitchFamily="49" charset="0"/>
               </a:rPr>
@@ -9551,49 +9514,49 @@
               <a:buNone/>
             </a:pPr>
             <a:r>
-              <a:rPr lang="en-GB" altLang="en-US" sz="2400" dirty="0" smtClean="0">
+              <a:rPr lang="en-GB" altLang="en-US" sz="2400" dirty="0">
                 <a:latin typeface="Courier New" panose="02070309020205020404" pitchFamily="49" charset="0"/>
                 <a:cs typeface="Courier New" panose="02070309020205020404" pitchFamily="49" charset="0"/>
               </a:rPr>
               <a:t>	    </a:t>
             </a:r>
             <a:r>
-              <a:rPr lang="en-GB" altLang="en-US" sz="2400" dirty="0" err="1" smtClean="0">
+              <a:rPr lang="en-GB" altLang="en-US" sz="2400" dirty="0" err="1">
                 <a:latin typeface="Courier New" panose="02070309020205020404" pitchFamily="49" charset="0"/>
                 <a:cs typeface="Courier New" panose="02070309020205020404" pitchFamily="49" charset="0"/>
               </a:rPr>
               <a:t>my_int</a:t>
             </a:r>
             <a:r>
-              <a:rPr lang="en-GB" altLang="en-US" sz="2400" dirty="0" smtClean="0">
+              <a:rPr lang="en-GB" altLang="en-US" sz="2400" dirty="0">
                 <a:latin typeface="Courier New" panose="02070309020205020404" pitchFamily="49" charset="0"/>
                 <a:cs typeface="Courier New" panose="02070309020205020404" pitchFamily="49" charset="0"/>
               </a:rPr>
               <a:t> = </a:t>
             </a:r>
             <a:r>
-              <a:rPr lang="en-GB" altLang="en-US" sz="2400" dirty="0" err="1" smtClean="0">
+              <a:rPr lang="en-GB" altLang="en-US" sz="2400" dirty="0" err="1">
                 <a:latin typeface="Courier New" panose="02070309020205020404" pitchFamily="49" charset="0"/>
                 <a:cs typeface="Courier New" panose="02070309020205020404" pitchFamily="49" charset="0"/>
               </a:rPr>
               <a:t>int</a:t>
             </a:r>
             <a:r>
-              <a:rPr lang="en-GB" altLang="en-US" sz="2400" dirty="0" smtClean="0">
+              <a:rPr lang="en-GB" altLang="en-US" sz="2400" dirty="0">
                 <a:latin typeface="Courier New" panose="02070309020205020404" pitchFamily="49" charset="0"/>
                 <a:cs typeface="Courier New" panose="02070309020205020404" pitchFamily="49" charset="0"/>
               </a:rPr>
               <a:t>(</a:t>
             </a:r>
             <a:r>
-              <a:rPr lang="en-GB" altLang="en-US" sz="2400" dirty="0" err="1" smtClean="0">
+              <a:rPr lang="en-GB" altLang="en-US" sz="2400" dirty="0" err="1">
                 <a:latin typeface="Courier New" panose="02070309020205020404" pitchFamily="49" charset="0"/>
                 <a:cs typeface="Courier New" panose="02070309020205020404" pitchFamily="49" charset="0"/>
               </a:rPr>
               <a:t>f.read</a:t>
             </a:r>
             <a:r>
-              <a:rPr lang="en-GB" altLang="en-US" sz="2400" dirty="0" smtClean="0">
+              <a:rPr lang="en-GB" altLang="en-US" sz="2400" dirty="0">
                 <a:latin typeface="Courier New" panose="02070309020205020404" pitchFamily="49" charset="0"/>
                 <a:cs typeface="Courier New" panose="02070309020205020404" pitchFamily="49" charset="0"/>
               </a:rPr>
@@ -9606,7 +9569,7 @@
               <a:buNone/>
             </a:pPr>
             <a:r>
-              <a:rPr lang="en-GB" altLang="en-US" sz="2400" dirty="0" smtClean="0">
+              <a:rPr lang="en-GB" altLang="en-US" sz="2400" dirty="0">
                 <a:latin typeface="Courier New" panose="02070309020205020404" pitchFamily="49" charset="0"/>
                 <a:cs typeface="Courier New" panose="02070309020205020404" pitchFamily="49" charset="0"/>
               </a:rPr>
@@ -9619,34 +9582,34 @@
               <a:buNone/>
             </a:pPr>
             <a:r>
-              <a:rPr lang="en-GB" altLang="en-US" sz="2400" dirty="0" smtClean="0">
+              <a:rPr lang="en-GB" altLang="en-US" sz="2400" dirty="0">
                 <a:latin typeface="Courier New" panose="02070309020205020404" pitchFamily="49" charset="0"/>
                 <a:cs typeface="Courier New" panose="02070309020205020404" pitchFamily="49" charset="0"/>
               </a:rPr>
               <a:t>    </a:t>
             </a:r>
             <a:r>
-              <a:rPr lang="en-GB" altLang="en-US" sz="2400" b="1" dirty="0" smtClean="0">
+              <a:rPr lang="en-GB" altLang="en-US" sz="2400" b="1" dirty="0">
                 <a:latin typeface="Courier New" panose="02070309020205020404" pitchFamily="49" charset="0"/>
                 <a:cs typeface="Courier New" panose="02070309020205020404" pitchFamily="49" charset="0"/>
               </a:rPr>
               <a:t>return</a:t>
             </a:r>
             <a:r>
-              <a:rPr lang="en-GB" altLang="en-US" sz="2400" dirty="0" smtClean="0">
+              <a:rPr lang="en-GB" altLang="en-US" sz="2400" dirty="0">
                 <a:latin typeface="Courier New" panose="02070309020205020404" pitchFamily="49" charset="0"/>
                 <a:cs typeface="Courier New" panose="02070309020205020404" pitchFamily="49" charset="0"/>
               </a:rPr>
               <a:t> </a:t>
             </a:r>
             <a:r>
-              <a:rPr lang="en-GB" altLang="en-US" sz="2400" dirty="0" err="1" smtClean="0">
+              <a:rPr lang="en-GB" altLang="en-US" sz="2400" dirty="0" err="1">
                 <a:latin typeface="Courier New" panose="02070309020205020404" pitchFamily="49" charset="0"/>
                 <a:cs typeface="Courier New" panose="02070309020205020404" pitchFamily="49" charset="0"/>
               </a:rPr>
               <a:t>my_int</a:t>
             </a:r>
-            <a:endParaRPr lang="en-GB" altLang="en-US" sz="2400" dirty="0" smtClean="0">
+            <a:endParaRPr lang="en-GB" altLang="en-US" sz="2400" dirty="0">
               <a:latin typeface="Courier New" panose="02070309020205020404" pitchFamily="49" charset="0"/>
               <a:cs typeface="Courier New" panose="02070309020205020404" pitchFamily="49" charset="0"/>
             </a:endParaRPr>
@@ -9658,13 +9621,6 @@
   <p:clrMapOvr>
     <a:masterClrMapping/>
   </p:clrMapOvr>
-  <p:timing>
-    <p:tnLst>
-      <p:par>
-        <p:cTn id="1" dur="indefinite" restart="never" nodeType="tmRoot"/>
-      </p:par>
-    </p:tnLst>
-  </p:timing>
 </p:sld>
 </file>
 

</xml_diff>